<commit_message>
add discussion + small fixes
</commit_message>
<xml_diff>
--- a/Bayesian Neural Network Presentation.pptx
+++ b/Bayesian Neural Network Presentation.pptx
@@ -32,23 +32,24 @@
     <p:sldId id="277" r:id="rId27"/>
     <p:sldId id="278" r:id="rId28"/>
     <p:sldId id="279" r:id="rId29"/>
+    <p:sldId id="280" r:id="rId30"/>
   </p:sldIdLst>
   <p:sldSz cy="6858000" cx="9144000"/>
   <p:notesSz cx="6858000" cy="9144000"/>
   <p:embeddedFontLst>
     <p:embeddedFont>
       <p:font typeface="Roboto"/>
-      <p:regular r:id="rId30"/>
-      <p:bold r:id="rId31"/>
-      <p:italic r:id="rId32"/>
-      <p:boldItalic r:id="rId33"/>
+      <p:regular r:id="rId31"/>
+      <p:bold r:id="rId32"/>
+      <p:italic r:id="rId33"/>
+      <p:boldItalic r:id="rId34"/>
     </p:embeddedFont>
     <p:embeddedFont>
       <p:font typeface="Playfair Display"/>
-      <p:regular r:id="rId34"/>
-      <p:bold r:id="rId35"/>
-      <p:italic r:id="rId36"/>
-      <p:boldItalic r:id="rId37"/>
+      <p:regular r:id="rId35"/>
+      <p:bold r:id="rId36"/>
+      <p:italic r:id="rId37"/>
+      <p:boldItalic r:id="rId38"/>
     </p:embeddedFont>
   </p:embeddedFontLst>
   <p:defaultTextStyle>
@@ -1376,7 +1377,7 @@
   <p:cSld>
     <p:spTree>
       <p:nvGrpSpPr>
-        <p:cNvPr id="165" name="Shape 165"/>
+        <p:cNvPr id="166" name="Shape 166"/>
         <p:cNvGrpSpPr/>
         <p:nvPr/>
       </p:nvGrpSpPr>
@@ -1390,7 +1391,7 @@
       </p:grpSpPr>
       <p:sp>
         <p:nvSpPr>
-          <p:cNvPr id="166" name="Google Shape;166;g29fb69b0a6e_0_143:notes"/>
+          <p:cNvPr id="167" name="Google Shape;167;g29fb69b0a6e_0_143:notes"/>
           <p:cNvSpPr/>
           <p:nvPr>
             <p:ph idx="2" type="sldImg"/>
@@ -1425,7 +1426,7 @@
       </p:sp>
       <p:sp>
         <p:nvSpPr>
-          <p:cNvPr id="167" name="Google Shape;167;g29fb69b0a6e_0_143:notes"/>
+          <p:cNvPr id="168" name="Google Shape;168;g29fb69b0a6e_0_143:notes"/>
           <p:cNvSpPr txBox="1"/>
           <p:nvPr>
             <p:ph idx="1" type="body"/>
@@ -1475,7 +1476,7 @@
   <p:cSld>
     <p:spTree>
       <p:nvGrpSpPr>
-        <p:cNvPr id="173" name="Shape 173"/>
+        <p:cNvPr id="174" name="Shape 174"/>
         <p:cNvGrpSpPr/>
         <p:nvPr/>
       </p:nvGrpSpPr>
@@ -1489,7 +1490,7 @@
       </p:grpSpPr>
       <p:sp>
         <p:nvSpPr>
-          <p:cNvPr id="174" name="Google Shape;174;g29fb69b0a6e_0_152:notes"/>
+          <p:cNvPr id="175" name="Google Shape;175;g29fb69b0a6e_0_152:notes"/>
           <p:cNvSpPr/>
           <p:nvPr>
             <p:ph idx="2" type="sldImg"/>
@@ -1524,7 +1525,7 @@
       </p:sp>
       <p:sp>
         <p:nvSpPr>
-          <p:cNvPr id="175" name="Google Shape;175;g29fb69b0a6e_0_152:notes"/>
+          <p:cNvPr id="176" name="Google Shape;176;g29fb69b0a6e_0_152:notes"/>
           <p:cNvSpPr txBox="1"/>
           <p:nvPr>
             <p:ph idx="1" type="body"/>
@@ -1574,7 +1575,7 @@
   <p:cSld>
     <p:spTree>
       <p:nvGrpSpPr>
-        <p:cNvPr id="181" name="Shape 181"/>
+        <p:cNvPr id="182" name="Shape 182"/>
         <p:cNvGrpSpPr/>
         <p:nvPr/>
       </p:nvGrpSpPr>
@@ -1588,7 +1589,7 @@
       </p:grpSpPr>
       <p:sp>
         <p:nvSpPr>
-          <p:cNvPr id="182" name="Google Shape;182;g29fb69b0a6e_0_161:notes"/>
+          <p:cNvPr id="183" name="Google Shape;183;g29fb69b0a6e_0_161:notes"/>
           <p:cNvSpPr/>
           <p:nvPr>
             <p:ph idx="2" type="sldImg"/>
@@ -1623,7 +1624,7 @@
       </p:sp>
       <p:sp>
         <p:nvSpPr>
-          <p:cNvPr id="183" name="Google Shape;183;g29fb69b0a6e_0_161:notes"/>
+          <p:cNvPr id="184" name="Google Shape;184;g29fb69b0a6e_0_161:notes"/>
           <p:cNvSpPr txBox="1"/>
           <p:nvPr>
             <p:ph idx="1" type="body"/>
@@ -1673,7 +1674,7 @@
   <p:cSld>
     <p:spTree>
       <p:nvGrpSpPr>
-        <p:cNvPr id="188" name="Shape 188"/>
+        <p:cNvPr id="189" name="Shape 189"/>
         <p:cNvGrpSpPr/>
         <p:nvPr/>
       </p:nvGrpSpPr>
@@ -1687,7 +1688,7 @@
       </p:grpSpPr>
       <p:sp>
         <p:nvSpPr>
-          <p:cNvPr id="189" name="Google Shape;189;g29fb69b0a6e_0_171:notes"/>
+          <p:cNvPr id="190" name="Google Shape;190;g29fb69b0a6e_0_171:notes"/>
           <p:cNvSpPr/>
           <p:nvPr>
             <p:ph idx="2" type="sldImg"/>
@@ -1722,7 +1723,7 @@
       </p:sp>
       <p:sp>
         <p:nvSpPr>
-          <p:cNvPr id="190" name="Google Shape;190;g29fb69b0a6e_0_171:notes"/>
+          <p:cNvPr id="191" name="Google Shape;191;g29fb69b0a6e_0_171:notes"/>
           <p:cNvSpPr txBox="1"/>
           <p:nvPr>
             <p:ph idx="1" type="body"/>
@@ -1772,7 +1773,7 @@
   <p:cSld>
     <p:spTree>
       <p:nvGrpSpPr>
-        <p:cNvPr id="197" name="Shape 197"/>
+        <p:cNvPr id="198" name="Shape 198"/>
         <p:cNvGrpSpPr/>
         <p:nvPr/>
       </p:nvGrpSpPr>
@@ -1786,7 +1787,7 @@
       </p:grpSpPr>
       <p:sp>
         <p:nvSpPr>
-          <p:cNvPr id="198" name="Google Shape;198;g29fb69b0a6e_0_180:notes"/>
+          <p:cNvPr id="199" name="Google Shape;199;g29fb69b0a6e_0_180:notes"/>
           <p:cNvSpPr/>
           <p:nvPr>
             <p:ph idx="2" type="sldImg"/>
@@ -1821,7 +1822,7 @@
       </p:sp>
       <p:sp>
         <p:nvSpPr>
-          <p:cNvPr id="199" name="Google Shape;199;g29fb69b0a6e_0_180:notes"/>
+          <p:cNvPr id="200" name="Google Shape;200;g29fb69b0a6e_0_180:notes"/>
           <p:cNvSpPr txBox="1"/>
           <p:nvPr>
             <p:ph idx="1" type="body"/>
@@ -1994,7 +1995,7 @@
   <p:cSld>
     <p:spTree>
       <p:nvGrpSpPr>
-        <p:cNvPr id="206" name="Shape 206"/>
+        <p:cNvPr id="207" name="Shape 207"/>
         <p:cNvGrpSpPr/>
         <p:nvPr/>
       </p:nvGrpSpPr>
@@ -2008,7 +2009,7 @@
       </p:grpSpPr>
       <p:sp>
         <p:nvSpPr>
-          <p:cNvPr id="207" name="Google Shape;207;g29fb69b0a6e_0_189:notes"/>
+          <p:cNvPr id="208" name="Google Shape;208;g29fb69b0a6e_0_189:notes"/>
           <p:cNvSpPr/>
           <p:nvPr>
             <p:ph idx="2" type="sldImg"/>
@@ -2043,7 +2044,7 @@
       </p:sp>
       <p:sp>
         <p:nvSpPr>
-          <p:cNvPr id="208" name="Google Shape;208;g29fb69b0a6e_0_189:notes"/>
+          <p:cNvPr id="209" name="Google Shape;209;g29fb69b0a6e_0_189:notes"/>
           <p:cNvSpPr txBox="1"/>
           <p:nvPr>
             <p:ph idx="1" type="body"/>
@@ -2093,7 +2094,7 @@
   <p:cSld>
     <p:spTree>
       <p:nvGrpSpPr>
-        <p:cNvPr id="214" name="Shape 214"/>
+        <p:cNvPr id="215" name="Shape 215"/>
         <p:cNvGrpSpPr/>
         <p:nvPr/>
       </p:nvGrpSpPr>
@@ -2107,7 +2108,7 @@
       </p:grpSpPr>
       <p:sp>
         <p:nvSpPr>
-          <p:cNvPr id="215" name="Google Shape;215;g29fb69b0a6e_0_21:notes"/>
+          <p:cNvPr id="216" name="Google Shape;216;g29fb69b0a6e_0_21:notes"/>
           <p:cNvSpPr/>
           <p:nvPr>
             <p:ph idx="2" type="sldImg"/>
@@ -2142,7 +2143,7 @@
       </p:sp>
       <p:sp>
         <p:nvSpPr>
-          <p:cNvPr id="216" name="Google Shape;216;g29fb69b0a6e_0_21:notes"/>
+          <p:cNvPr id="217" name="Google Shape;217;g29fb69b0a6e_0_21:notes"/>
           <p:cNvSpPr txBox="1"/>
           <p:nvPr>
             <p:ph idx="1" type="body"/>
@@ -2193,7 +2194,7 @@
   <p:cSld>
     <p:spTree>
       <p:nvGrpSpPr>
-        <p:cNvPr id="221" name="Shape 221"/>
+        <p:cNvPr id="222" name="Shape 222"/>
         <p:cNvGrpSpPr/>
         <p:nvPr/>
       </p:nvGrpSpPr>
@@ -2207,7 +2208,7 @@
       </p:grpSpPr>
       <p:sp>
         <p:nvSpPr>
-          <p:cNvPr id="222" name="Google Shape;222;g29fb69b0a6e_0_218:notes"/>
+          <p:cNvPr id="223" name="Google Shape;223;g29fb69b0a6e_0_218:notes"/>
           <p:cNvSpPr/>
           <p:nvPr>
             <p:ph idx="2" type="sldImg"/>
@@ -2242,7 +2243,7 @@
       </p:sp>
       <p:sp>
         <p:nvSpPr>
-          <p:cNvPr id="223" name="Google Shape;223;g29fb69b0a6e_0_218:notes"/>
+          <p:cNvPr id="224" name="Google Shape;224;g29fb69b0a6e_0_218:notes"/>
           <p:cNvSpPr txBox="1"/>
           <p:nvPr>
             <p:ph idx="1" type="body"/>
@@ -2292,7 +2293,7 @@
   <p:cSld>
     <p:spTree>
       <p:nvGrpSpPr>
-        <p:cNvPr id="228" name="Shape 228"/>
+        <p:cNvPr id="229" name="Shape 229"/>
         <p:cNvGrpSpPr/>
         <p:nvPr/>
       </p:nvGrpSpPr>
@@ -2306,7 +2307,7 @@
       </p:grpSpPr>
       <p:sp>
         <p:nvSpPr>
-          <p:cNvPr id="229" name="Google Shape;229;g29fb69b0a6e_0_202:notes"/>
+          <p:cNvPr id="230" name="Google Shape;230;g29fb69b0a6e_0_202:notes"/>
           <p:cNvSpPr/>
           <p:nvPr>
             <p:ph idx="2" type="sldImg"/>
@@ -2341,7 +2342,7 @@
       </p:sp>
       <p:sp>
         <p:nvSpPr>
-          <p:cNvPr id="230" name="Google Shape;230;g29fb69b0a6e_0_202:notes"/>
+          <p:cNvPr id="231" name="Google Shape;231;g29fb69b0a6e_0_202:notes"/>
           <p:cNvSpPr txBox="1"/>
           <p:nvPr>
             <p:ph idx="1" type="body"/>
@@ -2391,7 +2392,7 @@
   <p:cSld>
     <p:spTree>
       <p:nvGrpSpPr>
-        <p:cNvPr id="236" name="Shape 236"/>
+        <p:cNvPr id="237" name="Shape 237"/>
         <p:cNvGrpSpPr/>
         <p:nvPr/>
       </p:nvGrpSpPr>
@@ -2405,7 +2406,7 @@
       </p:grpSpPr>
       <p:sp>
         <p:nvSpPr>
-          <p:cNvPr id="237" name="Google Shape;237;g29fb69b0a6e_0_228:notes"/>
+          <p:cNvPr id="238" name="Google Shape;238;g29fb69b0a6e_0_228:notes"/>
           <p:cNvSpPr/>
           <p:nvPr>
             <p:ph idx="2" type="sldImg"/>
@@ -2440,7 +2441,106 @@
       </p:sp>
       <p:sp>
         <p:nvSpPr>
-          <p:cNvPr id="238" name="Google Shape;238;g29fb69b0a6e_0_228:notes"/>
+          <p:cNvPr id="239" name="Google Shape;239;g29fb69b0a6e_0_228:notes"/>
+          <p:cNvSpPr txBox="1"/>
+          <p:nvPr>
+            <p:ph idx="1" type="body"/>
+          </p:nvPr>
+        </p:nvSpPr>
+        <p:spPr>
+          <a:xfrm>
+            <a:off x="685800" y="4343400"/>
+            <a:ext cx="5486400" cy="4114800"/>
+          </a:xfrm>
+          <a:prstGeom prst="rect">
+            <a:avLst/>
+          </a:prstGeom>
+        </p:spPr>
+        <p:txBody>
+          <a:bodyPr anchorCtr="0" anchor="t" bIns="91425" lIns="91425" spcFirstLastPara="1" rIns="91425" wrap="square" tIns="91425">
+            <a:noAutofit/>
+          </a:bodyPr>
+          <a:lstStyle/>
+          <a:p>
+            <a:pPr indent="0" lvl="0" marL="0" rtl="0" algn="l">
+              <a:spcBef>
+                <a:spcPts val="0"/>
+              </a:spcBef>
+              <a:spcAft>
+                <a:spcPts val="0"/>
+              </a:spcAft>
+              <a:buNone/>
+            </a:pPr>
+            <a:r>
+              <a:t/>
+            </a:r>
+            <a:endParaRPr/>
+          </a:p>
+        </p:txBody>
+      </p:sp>
+    </p:spTree>
+  </p:cSld>
+  <p:clrMapOvr>
+    <a:masterClrMapping/>
+  </p:clrMapOvr>
+</p:notes>
+</file>
+
+<file path=ppt/notesSlides/notesSlide25.xml><?xml version="1.0" encoding="utf-8"?>
+<p:notes xmlns:a="http://schemas.openxmlformats.org/drawingml/2006/main" xmlns:r="http://schemas.openxmlformats.org/officeDocument/2006/relationships" xmlns:mc="http://schemas.openxmlformats.org/markup-compatibility/2006" xmlns:mv="urn:schemas-microsoft-com:mac:vml" xmlns:p="http://schemas.openxmlformats.org/presentationml/2006/main" xmlns:c="http://schemas.openxmlformats.org/drawingml/2006/chart" xmlns:dgm="http://schemas.openxmlformats.org/drawingml/2006/diagram" xmlns:o="urn:schemas-microsoft-com:office:office" xmlns:v="urn:schemas-microsoft-com:vml" xmlns:pvml="urn:schemas-microsoft-com:office:powerpoint" xmlns:com="http://schemas.openxmlformats.org/drawingml/2006/compatibility" xmlns:p14="http://schemas.microsoft.com/office/powerpoint/2010/main" xmlns:p15="http://schemas.microsoft.com/office/powerpoint/2012/main" xmlns:ahyp="http://schemas.microsoft.com/office/drawing/2018/hyperlinkcolor" showMasterPhAnim="0" showMasterSp="0">
+  <p:cSld>
+    <p:spTree>
+      <p:nvGrpSpPr>
+        <p:cNvPr id="246" name="Shape 246"/>
+        <p:cNvGrpSpPr/>
+        <p:nvPr/>
+      </p:nvGrpSpPr>
+      <p:grpSpPr>
+        <a:xfrm>
+          <a:off x="0" y="0"/>
+          <a:ext cx="0" cy="0"/>
+          <a:chOff x="0" y="0"/>
+          <a:chExt cx="0" cy="0"/>
+        </a:xfrm>
+      </p:grpSpPr>
+      <p:sp>
+        <p:nvSpPr>
+          <p:cNvPr id="247" name="Google Shape;247;g2a55ac4951d_0_0:notes"/>
+          <p:cNvSpPr/>
+          <p:nvPr>
+            <p:ph idx="2" type="sldImg"/>
+          </p:nvPr>
+        </p:nvSpPr>
+        <p:spPr>
+          <a:xfrm>
+            <a:off x="1143309" y="685800"/>
+            <a:ext cx="4572000" cy="3429000"/>
+          </a:xfrm>
+          <a:custGeom>
+            <a:rect b="b" l="l" r="r" t="t"/>
+            <a:pathLst>
+              <a:path extrusionOk="0" h="120000" w="120000">
+                <a:moveTo>
+                  <a:pt x="0" y="0"/>
+                </a:moveTo>
+                <a:lnTo>
+                  <a:pt x="120000" y="0"/>
+                </a:lnTo>
+                <a:lnTo>
+                  <a:pt x="120000" y="120000"/>
+                </a:lnTo>
+                <a:lnTo>
+                  <a:pt x="0" y="120000"/>
+                </a:lnTo>
+                <a:close/>
+              </a:path>
+            </a:pathLst>
+          </a:custGeom>
+        </p:spPr>
+      </p:sp>
+      <p:sp>
+        <p:nvSpPr>
+          <p:cNvPr id="248" name="Google Shape;248;g2a55ac4951d_0_0:notes"/>
           <p:cNvSpPr txBox="1"/>
           <p:nvPr>
             <p:ph idx="1" type="body"/>
@@ -9637,6 +9737,34 @@
           </a:ln>
         </p:spPr>
       </p:pic>
+      <p:pic>
+        <p:nvPicPr>
+          <p:cNvPr id="165" name="Google Shape;165;p26"/>
+          <p:cNvPicPr preferRelativeResize="0"/>
+          <p:nvPr/>
+        </p:nvPicPr>
+        <p:blipFill>
+          <a:blip r:embed="rId6">
+            <a:alphaModFix/>
+          </a:blip>
+          <a:stretch>
+            <a:fillRect/>
+          </a:stretch>
+        </p:blipFill>
+        <p:spPr>
+          <a:xfrm>
+            <a:off x="4758300" y="3795100"/>
+            <a:ext cx="2638425" cy="276225"/>
+          </a:xfrm>
+          <a:prstGeom prst="rect">
+            <a:avLst/>
+          </a:prstGeom>
+          <a:noFill/>
+          <a:ln>
+            <a:noFill/>
+          </a:ln>
+        </p:spPr>
+      </p:pic>
     </p:spTree>
   </p:cSld>
   <p:clrMapOvr>
@@ -9650,7 +9778,7 @@
   <p:cSld>
     <p:spTree>
       <p:nvGrpSpPr>
-        <p:cNvPr id="168" name="Shape 168"/>
+        <p:cNvPr id="169" name="Shape 169"/>
         <p:cNvGrpSpPr/>
         <p:nvPr/>
       </p:nvGrpSpPr>
@@ -9664,7 +9792,7 @@
       </p:grpSpPr>
       <p:sp>
         <p:nvSpPr>
-          <p:cNvPr id="169" name="Google Shape;169;p27"/>
+          <p:cNvPr id="170" name="Google Shape;170;p27"/>
           <p:cNvSpPr txBox="1"/>
           <p:nvPr>
             <p:ph type="title"/>
@@ -9723,7 +9851,7 @@
       </p:sp>
       <p:sp>
         <p:nvSpPr>
-          <p:cNvPr id="170" name="Google Shape;170;p27"/>
+          <p:cNvPr id="171" name="Google Shape;171;p27"/>
           <p:cNvSpPr txBox="1"/>
           <p:nvPr>
             <p:ph idx="1" type="body"/>
@@ -10020,7 +10148,7 @@
       </p:sp>
       <p:sp>
         <p:nvSpPr>
-          <p:cNvPr id="171" name="Google Shape;171;p27"/>
+          <p:cNvPr id="172" name="Google Shape;172;p27"/>
           <p:cNvSpPr txBox="1"/>
           <p:nvPr>
             <p:ph idx="12" type="sldNum"/>
@@ -10060,7 +10188,7 @@
       </p:sp>
       <p:pic>
         <p:nvPicPr>
-          <p:cNvPr id="172" name="Google Shape;172;p27"/>
+          <p:cNvPr id="173" name="Google Shape;173;p27"/>
           <p:cNvPicPr preferRelativeResize="0"/>
           <p:nvPr/>
         </p:nvPicPr>
@@ -10099,7 +10227,7 @@
   <p:cSld>
     <p:spTree>
       <p:nvGrpSpPr>
-        <p:cNvPr id="176" name="Shape 176"/>
+        <p:cNvPr id="177" name="Shape 177"/>
         <p:cNvGrpSpPr/>
         <p:nvPr/>
       </p:nvGrpSpPr>
@@ -10113,7 +10241,7 @@
       </p:grpSpPr>
       <p:sp>
         <p:nvSpPr>
-          <p:cNvPr id="177" name="Google Shape;177;p28"/>
+          <p:cNvPr id="178" name="Google Shape;178;p28"/>
           <p:cNvSpPr txBox="1"/>
           <p:nvPr>
             <p:ph type="title"/>
@@ -10163,7 +10291,7 @@
       </p:sp>
       <p:sp>
         <p:nvSpPr>
-          <p:cNvPr id="178" name="Google Shape;178;p28"/>
+          <p:cNvPr id="179" name="Google Shape;179;p28"/>
           <p:cNvSpPr txBox="1"/>
           <p:nvPr>
             <p:ph idx="1" type="body"/>
@@ -10250,7 +10378,7 @@
       </p:sp>
       <p:sp>
         <p:nvSpPr>
-          <p:cNvPr id="179" name="Google Shape;179;p28"/>
+          <p:cNvPr id="180" name="Google Shape;180;p28"/>
           <p:cNvSpPr txBox="1"/>
           <p:nvPr>
             <p:ph idx="12" type="sldNum"/>
@@ -10290,7 +10418,7 @@
       </p:sp>
       <p:pic>
         <p:nvPicPr>
-          <p:cNvPr id="180" name="Google Shape;180;p28"/>
+          <p:cNvPr id="181" name="Google Shape;181;p28"/>
           <p:cNvPicPr preferRelativeResize="0"/>
           <p:nvPr/>
         </p:nvPicPr>
@@ -10329,7 +10457,7 @@
   <p:cSld>
     <p:spTree>
       <p:nvGrpSpPr>
-        <p:cNvPr id="184" name="Shape 184"/>
+        <p:cNvPr id="185" name="Shape 185"/>
         <p:cNvGrpSpPr/>
         <p:nvPr/>
       </p:nvGrpSpPr>
@@ -10343,7 +10471,7 @@
       </p:grpSpPr>
       <p:sp>
         <p:nvSpPr>
-          <p:cNvPr id="185" name="Google Shape;185;p29"/>
+          <p:cNvPr id="186" name="Google Shape;186;p29"/>
           <p:cNvSpPr txBox="1"/>
           <p:nvPr>
             <p:ph idx="12" type="sldNum"/>
@@ -10383,7 +10511,7 @@
       </p:sp>
       <p:pic>
         <p:nvPicPr>
-          <p:cNvPr id="186" name="Google Shape;186;p29"/>
+          <p:cNvPr id="187" name="Google Shape;187;p29"/>
           <p:cNvPicPr preferRelativeResize="0"/>
           <p:nvPr/>
         </p:nvPicPr>
@@ -10411,7 +10539,7 @@
       </p:pic>
       <p:sp>
         <p:nvSpPr>
-          <p:cNvPr id="187" name="Google Shape;187;p29"/>
+          <p:cNvPr id="188" name="Google Shape;188;p29"/>
           <p:cNvSpPr txBox="1"/>
           <p:nvPr/>
         </p:nvSpPr>
@@ -10528,7 +10656,7 @@
   <p:cSld>
     <p:spTree>
       <p:nvGrpSpPr>
-        <p:cNvPr id="191" name="Shape 191"/>
+        <p:cNvPr id="192" name="Shape 192"/>
         <p:cNvGrpSpPr/>
         <p:nvPr/>
       </p:nvGrpSpPr>
@@ -10542,7 +10670,7 @@
       </p:grpSpPr>
       <p:sp>
         <p:nvSpPr>
-          <p:cNvPr id="192" name="Google Shape;192;p30"/>
+          <p:cNvPr id="193" name="Google Shape;193;p30"/>
           <p:cNvSpPr txBox="1"/>
           <p:nvPr>
             <p:ph type="title"/>
@@ -10592,7 +10720,7 @@
       </p:sp>
       <p:sp>
         <p:nvSpPr>
-          <p:cNvPr id="193" name="Google Shape;193;p30"/>
+          <p:cNvPr id="194" name="Google Shape;194;p30"/>
           <p:cNvSpPr txBox="1"/>
           <p:nvPr>
             <p:ph idx="1" type="body"/>
@@ -10809,7 +10937,7 @@
       </p:sp>
       <p:sp>
         <p:nvSpPr>
-          <p:cNvPr id="194" name="Google Shape;194;p30"/>
+          <p:cNvPr id="195" name="Google Shape;195;p30"/>
           <p:cNvSpPr txBox="1"/>
           <p:nvPr>
             <p:ph idx="12" type="sldNum"/>
@@ -10849,7 +10977,7 @@
       </p:sp>
       <p:pic>
         <p:nvPicPr>
-          <p:cNvPr id="195" name="Google Shape;195;p30"/>
+          <p:cNvPr id="196" name="Google Shape;196;p30"/>
           <p:cNvPicPr preferRelativeResize="0"/>
           <p:nvPr/>
         </p:nvPicPr>
@@ -10877,7 +11005,7 @@
       </p:pic>
       <p:pic>
         <p:nvPicPr>
-          <p:cNvPr id="196" name="Google Shape;196;p30"/>
+          <p:cNvPr id="197" name="Google Shape;197;p30"/>
           <p:cNvPicPr preferRelativeResize="0"/>
           <p:nvPr/>
         </p:nvPicPr>
@@ -10916,7 +11044,7 @@
   <p:cSld>
     <p:spTree>
       <p:nvGrpSpPr>
-        <p:cNvPr id="200" name="Shape 200"/>
+        <p:cNvPr id="201" name="Shape 201"/>
         <p:cNvGrpSpPr/>
         <p:nvPr/>
       </p:nvGrpSpPr>
@@ -10930,7 +11058,7 @@
       </p:grpSpPr>
       <p:sp>
         <p:nvSpPr>
-          <p:cNvPr id="201" name="Google Shape;201;p31"/>
+          <p:cNvPr id="202" name="Google Shape;202;p31"/>
           <p:cNvSpPr txBox="1"/>
           <p:nvPr>
             <p:ph type="title"/>
@@ -10980,7 +11108,7 @@
       </p:sp>
       <p:sp>
         <p:nvSpPr>
-          <p:cNvPr id="202" name="Google Shape;202;p31"/>
+          <p:cNvPr id="203" name="Google Shape;203;p31"/>
           <p:cNvSpPr txBox="1"/>
           <p:nvPr>
             <p:ph idx="1" type="body"/>
@@ -11067,7 +11195,7 @@
       </p:sp>
       <p:sp>
         <p:nvSpPr>
-          <p:cNvPr id="203" name="Google Shape;203;p31"/>
+          <p:cNvPr id="204" name="Google Shape;204;p31"/>
           <p:cNvSpPr txBox="1"/>
           <p:nvPr>
             <p:ph idx="12" type="sldNum"/>
@@ -11107,7 +11235,7 @@
       </p:sp>
       <p:pic>
         <p:nvPicPr>
-          <p:cNvPr id="204" name="Google Shape;204;p31"/>
+          <p:cNvPr id="205" name="Google Shape;205;p31"/>
           <p:cNvPicPr preferRelativeResize="0"/>
           <p:nvPr/>
         </p:nvPicPr>
@@ -11135,7 +11263,7 @@
       </p:pic>
       <p:sp>
         <p:nvSpPr>
-          <p:cNvPr id="205" name="Google Shape;205;p31"/>
+          <p:cNvPr id="206" name="Google Shape;206;p31"/>
           <p:cNvSpPr txBox="1"/>
           <p:nvPr/>
         </p:nvSpPr>
@@ -11331,11 +11459,11 @@
         </p:spPr>
         <p:txBody>
           <a:bodyPr anchorCtr="0" anchor="t" bIns="91425" lIns="91425" spcFirstLastPara="1" rIns="91425" wrap="square" tIns="91425">
-            <a:normAutofit fontScale="85000" lnSpcReduction="20000"/>
+            <a:normAutofit/>
           </a:bodyPr>
           <a:lstStyle/>
           <a:p>
-            <a:pPr indent="-347345" lvl="0" marL="457200" rtl="0" algn="l">
+            <a:pPr indent="-381000" lvl="0" marL="457200" rtl="0" algn="l">
               <a:lnSpc>
                 <a:spcPct val="105000"/>
               </a:lnSpc>
@@ -11345,17 +11473,17 @@
               <a:spcAft>
                 <a:spcPts val="0"/>
               </a:spcAft>
-              <a:buSzPct val="100000"/>
+              <a:buSzPts val="2400"/>
               <a:buChar char="●"/>
             </a:pPr>
             <a:r>
-              <a:rPr lang="en" sz="2200"/>
+              <a:rPr lang="en" sz="2400"/>
               <a:t>Approach and general overview</a:t>
             </a:r>
-            <a:endParaRPr sz="2200"/>
-          </a:p>
-          <a:p>
-            <a:pPr indent="-347345" lvl="0" marL="457200" rtl="0" algn="l">
+            <a:endParaRPr sz="2400"/>
+          </a:p>
+          <a:p>
+            <a:pPr indent="-381000" lvl="0" marL="457200" rtl="0" algn="l">
               <a:lnSpc>
                 <a:spcPct val="105000"/>
               </a:lnSpc>
@@ -11365,17 +11493,17 @@
               <a:spcAft>
                 <a:spcPts val="0"/>
               </a:spcAft>
-              <a:buSzPct val="100000"/>
+              <a:buSzPts val="2400"/>
               <a:buChar char="●"/>
             </a:pPr>
             <a:r>
-              <a:rPr lang="en" sz="2200"/>
+              <a:rPr lang="en" sz="2400"/>
               <a:t>Methodology</a:t>
             </a:r>
-            <a:endParaRPr sz="2200"/>
-          </a:p>
-          <a:p>
-            <a:pPr indent="-347344" lvl="1" marL="914400" rtl="0" algn="l">
+            <a:endParaRPr sz="2400"/>
+          </a:p>
+          <a:p>
+            <a:pPr indent="-381000" lvl="1" marL="914400" rtl="0" algn="l">
               <a:lnSpc>
                 <a:spcPct val="105000"/>
               </a:lnSpc>
@@ -11385,17 +11513,17 @@
               <a:spcAft>
                 <a:spcPts val="0"/>
               </a:spcAft>
-              <a:buSzPct val="100000"/>
+              <a:buSzPts val="2400"/>
               <a:buChar char="○"/>
             </a:pPr>
             <a:r>
-              <a:rPr lang="en" sz="2200"/>
+              <a:rPr lang="en" sz="2400"/>
               <a:t>Tasks</a:t>
             </a:r>
-            <a:endParaRPr sz="2200"/>
-          </a:p>
-          <a:p>
-            <a:pPr indent="-347344" lvl="1" marL="914400" rtl="0" algn="l">
+            <a:endParaRPr sz="2400"/>
+          </a:p>
+          <a:p>
+            <a:pPr indent="-381000" lvl="1" marL="914400" rtl="0" algn="l">
               <a:lnSpc>
                 <a:spcPct val="105000"/>
               </a:lnSpc>
@@ -11405,17 +11533,17 @@
               <a:spcAft>
                 <a:spcPts val="0"/>
               </a:spcAft>
-              <a:buSzPct val="100000"/>
+              <a:buSzPts val="2400"/>
               <a:buChar char="○"/>
             </a:pPr>
             <a:r>
-              <a:rPr lang="en" sz="2200"/>
+              <a:rPr lang="en" sz="2400"/>
               <a:t>Extensions</a:t>
             </a:r>
-            <a:endParaRPr sz="2200"/>
-          </a:p>
-          <a:p>
-            <a:pPr indent="-347344" lvl="2" marL="1371600" rtl="0" algn="l">
+            <a:endParaRPr sz="2400"/>
+          </a:p>
+          <a:p>
+            <a:pPr indent="-381000" lvl="2" marL="1371600" rtl="0" algn="l">
               <a:lnSpc>
                 <a:spcPct val="105000"/>
               </a:lnSpc>
@@ -11425,17 +11553,17 @@
               <a:spcAft>
                 <a:spcPts val="0"/>
               </a:spcAft>
-              <a:buSzPct val="100000"/>
+              <a:buSzPts val="2400"/>
               <a:buChar char="■"/>
             </a:pPr>
             <a:r>
-              <a:rPr lang="en" sz="2200"/>
+              <a:rPr lang="en" sz="2400"/>
               <a:t>Uncertainty on vanilla MNIST </a:t>
             </a:r>
-            <a:endParaRPr sz="2200"/>
-          </a:p>
-          <a:p>
-            <a:pPr indent="-347344" lvl="2" marL="1371600" rtl="0" algn="l">
+            <a:endParaRPr sz="2400"/>
+          </a:p>
+          <a:p>
+            <a:pPr indent="-381000" lvl="2" marL="1371600" rtl="0" algn="l">
               <a:lnSpc>
                 <a:spcPct val="105000"/>
               </a:lnSpc>
@@ -11445,17 +11573,17 @@
               <a:spcAft>
                 <a:spcPts val="0"/>
               </a:spcAft>
-              <a:buSzPct val="100000"/>
+              <a:buSzPts val="2400"/>
               <a:buChar char="■"/>
             </a:pPr>
             <a:r>
-              <a:rPr lang="en" sz="2200"/>
+              <a:rPr lang="en" sz="2400"/>
               <a:t>Adversarial Testing/Training</a:t>
             </a:r>
-            <a:endParaRPr sz="2200"/>
-          </a:p>
-          <a:p>
-            <a:pPr indent="-347344" lvl="2" marL="1371600" rtl="0" algn="l">
+            <a:endParaRPr sz="2400"/>
+          </a:p>
+          <a:p>
+            <a:pPr indent="-381000" lvl="2" marL="1371600" rtl="0" algn="l">
               <a:lnSpc>
                 <a:spcPct val="105000"/>
               </a:lnSpc>
@@ -11465,17 +11593,17 @@
               <a:spcAft>
                 <a:spcPts val="0"/>
               </a:spcAft>
-              <a:buSzPct val="100000"/>
+              <a:buSzPts val="2400"/>
               <a:buChar char="■"/>
             </a:pPr>
             <a:r>
-              <a:rPr lang="en" sz="2200"/>
+              <a:rPr lang="en" sz="2400"/>
               <a:t>Regression </a:t>
             </a:r>
-            <a:endParaRPr sz="2200"/>
-          </a:p>
-          <a:p>
-            <a:pPr indent="-347345" lvl="0" marL="457200" rtl="0" algn="l">
+            <a:endParaRPr sz="2400"/>
+          </a:p>
+          <a:p>
+            <a:pPr indent="-381000" lvl="0" marL="457200" rtl="0" algn="l">
               <a:lnSpc>
                 <a:spcPct val="105000"/>
               </a:lnSpc>
@@ -11485,329 +11613,14 @@
               <a:spcAft>
                 <a:spcPts val="0"/>
               </a:spcAft>
-              <a:buSzPct val="100000"/>
+              <a:buSzPts val="2400"/>
               <a:buChar char="●"/>
             </a:pPr>
             <a:r>
-              <a:rPr lang="en" sz="2200"/>
+              <a:rPr lang="en" sz="2400"/>
               <a:t>Results</a:t>
             </a:r>
-            <a:endParaRPr sz="2200"/>
-          </a:p>
-          <a:p>
-            <a:pPr indent="0" lvl="0" marL="0" rtl="0" algn="l">
-              <a:lnSpc>
-                <a:spcPct val="105000"/>
-              </a:lnSpc>
-              <a:spcBef>
-                <a:spcPts val="1200"/>
-              </a:spcBef>
-              <a:spcAft>
-                <a:spcPts val="0"/>
-              </a:spcAft>
-              <a:buNone/>
-            </a:pPr>
-            <a:r>
-              <a:t/>
-            </a:r>
-            <a:endParaRPr sz="2200"/>
-          </a:p>
-          <a:p>
-            <a:pPr indent="0" lvl="0" marL="0" rtl="0" algn="l">
-              <a:lnSpc>
-                <a:spcPct val="105000"/>
-              </a:lnSpc>
-              <a:spcBef>
-                <a:spcPts val="1200"/>
-              </a:spcBef>
-              <a:spcAft>
-                <a:spcPts val="0"/>
-              </a:spcAft>
-              <a:buNone/>
-            </a:pPr>
-            <a:r>
-              <a:rPr lang="en" sz="2200" u="sng">
-                <a:solidFill>
-                  <a:schemeClr val="hlink"/>
-                </a:solidFill>
-                <a:hlinkClick r:id="rId3"/>
-              </a:rPr>
-              <a:t>https://foolbox.jonasrauber.de/</a:t>
-            </a:r>
-            <a:endParaRPr sz="2200"/>
-          </a:p>
-          <a:p>
-            <a:pPr indent="0" lvl="0" marL="0" rtl="0" algn="l">
-              <a:spcBef>
-                <a:spcPts val="1200"/>
-              </a:spcBef>
-              <a:spcAft>
-                <a:spcPts val="0"/>
-              </a:spcAft>
-              <a:buClr>
-                <a:schemeClr val="dk1"/>
-              </a:buClr>
-              <a:buSzPct val="91666"/>
-              <a:buFont typeface="Arial"/>
-              <a:buNone/>
-            </a:pPr>
-            <a:r>
-              <a:rPr lang="en" sz="1200">
-                <a:solidFill>
-                  <a:srgbClr val="374151"/>
-                </a:solidFill>
-                <a:latin typeface="Roboto"/>
-                <a:ea typeface="Roboto"/>
-                <a:cs typeface="Roboto"/>
-                <a:sym typeface="Roboto"/>
-              </a:rPr>
-              <a:t>To modify your model and training code for a regression task, several key changes are needed:</a:t>
-            </a:r>
-            <a:endParaRPr sz="1200">
-              <a:solidFill>
-                <a:srgbClr val="374151"/>
-              </a:solidFill>
-              <a:latin typeface="Roboto"/>
-              <a:ea typeface="Roboto"/>
-              <a:cs typeface="Roboto"/>
-              <a:sym typeface="Roboto"/>
-            </a:endParaRPr>
-          </a:p>
-          <a:p>
-            <a:pPr indent="-228600" lvl="0" marL="457200" rtl="0" algn="l">
-              <a:spcBef>
-                <a:spcPts val="1500"/>
-              </a:spcBef>
-              <a:spcAft>
-                <a:spcPts val="0"/>
-              </a:spcAft>
-              <a:buClr>
-                <a:srgbClr val="374151"/>
-              </a:buClr>
-              <a:buSzPct val="100000"/>
-              <a:buFont typeface="Roboto"/>
-              <a:buNone/>
-            </a:pPr>
-            <a:r>
-              <a:rPr lang="en" sz="1200">
-                <a:solidFill>
-                  <a:srgbClr val="374151"/>
-                </a:solidFill>
-                <a:latin typeface="Roboto"/>
-                <a:ea typeface="Roboto"/>
-                <a:cs typeface="Roboto"/>
-                <a:sym typeface="Roboto"/>
-              </a:rPr>
-              <a:t>Output Layer: The final layer of the model should have a single output neuron (for a single-target regression task) or as many neurons as the number of targets you're predicting.</a:t>
-            </a:r>
-            <a:endParaRPr sz="1200">
-              <a:solidFill>
-                <a:srgbClr val="374151"/>
-              </a:solidFill>
-              <a:latin typeface="Roboto"/>
-              <a:ea typeface="Roboto"/>
-              <a:cs typeface="Roboto"/>
-              <a:sym typeface="Roboto"/>
-            </a:endParaRPr>
-          </a:p>
-          <a:p>
-            <a:pPr indent="-228600" lvl="0" marL="457200" rtl="0" algn="l">
-              <a:spcBef>
-                <a:spcPts val="0"/>
-              </a:spcBef>
-              <a:spcAft>
-                <a:spcPts val="0"/>
-              </a:spcAft>
-              <a:buClr>
-                <a:srgbClr val="374151"/>
-              </a:buClr>
-              <a:buSzPct val="100000"/>
-              <a:buFont typeface="Roboto"/>
-              <a:buNone/>
-            </a:pPr>
-            <a:r>
-              <a:rPr lang="en" sz="1200">
-                <a:solidFill>
-                  <a:srgbClr val="374151"/>
-                </a:solidFill>
-                <a:latin typeface="Roboto"/>
-                <a:ea typeface="Roboto"/>
-                <a:cs typeface="Roboto"/>
-                <a:sym typeface="Roboto"/>
-              </a:rPr>
-              <a:t>Loss Function: Instead of </a:t>
-            </a:r>
-            <a:r>
-              <a:rPr lang="en" sz="1050">
-                <a:solidFill>
-                  <a:srgbClr val="374151"/>
-                </a:solidFill>
-                <a:latin typeface="Roboto"/>
-                <a:ea typeface="Roboto"/>
-                <a:cs typeface="Roboto"/>
-                <a:sym typeface="Roboto"/>
-              </a:rPr>
-              <a:t>CrossEntropyLoss</a:t>
-            </a:r>
-            <a:r>
-              <a:rPr lang="en" sz="1200">
-                <a:solidFill>
-                  <a:srgbClr val="374151"/>
-                </a:solidFill>
-                <a:latin typeface="Roboto"/>
-                <a:ea typeface="Roboto"/>
-                <a:cs typeface="Roboto"/>
-                <a:sym typeface="Roboto"/>
-              </a:rPr>
-              <a:t>, which is used for classification, you should use a regression-appropriate loss function like Mean Squared Error (</a:t>
-            </a:r>
-            <a:r>
-              <a:rPr lang="en" sz="1050">
-                <a:solidFill>
-                  <a:srgbClr val="374151"/>
-                </a:solidFill>
-                <a:latin typeface="Roboto"/>
-                <a:ea typeface="Roboto"/>
-                <a:cs typeface="Roboto"/>
-                <a:sym typeface="Roboto"/>
-              </a:rPr>
-              <a:t>nn.MSELoss</a:t>
-            </a:r>
-            <a:r>
-              <a:rPr lang="en" sz="1200">
-                <a:solidFill>
-                  <a:srgbClr val="374151"/>
-                </a:solidFill>
-                <a:latin typeface="Roboto"/>
-                <a:ea typeface="Roboto"/>
-                <a:cs typeface="Roboto"/>
-                <a:sym typeface="Roboto"/>
-              </a:rPr>
-              <a:t>).</a:t>
-            </a:r>
-            <a:endParaRPr sz="1200">
-              <a:solidFill>
-                <a:srgbClr val="374151"/>
-              </a:solidFill>
-              <a:latin typeface="Roboto"/>
-              <a:ea typeface="Roboto"/>
-              <a:cs typeface="Roboto"/>
-              <a:sym typeface="Roboto"/>
-            </a:endParaRPr>
-          </a:p>
-          <a:p>
-            <a:pPr indent="-228600" lvl="0" marL="457200" rtl="0" algn="l">
-              <a:spcBef>
-                <a:spcPts val="0"/>
-              </a:spcBef>
-              <a:spcAft>
-                <a:spcPts val="0"/>
-              </a:spcAft>
-              <a:buClr>
-                <a:srgbClr val="374151"/>
-              </a:buClr>
-              <a:buSzPct val="100000"/>
-              <a:buFont typeface="Roboto"/>
-              <a:buNone/>
-            </a:pPr>
-            <a:r>
-              <a:rPr lang="en" sz="1200">
-                <a:solidFill>
-                  <a:srgbClr val="374151"/>
-                </a:solidFill>
-                <a:latin typeface="Roboto"/>
-                <a:ea typeface="Roboto"/>
-                <a:cs typeface="Roboto"/>
-                <a:sym typeface="Roboto"/>
-              </a:rPr>
-              <a:t>Data Preparation: Ensure that your target data (</a:t>
-            </a:r>
-            <a:r>
-              <a:rPr lang="en" sz="1050">
-                <a:solidFill>
-                  <a:srgbClr val="374151"/>
-                </a:solidFill>
-                <a:latin typeface="Roboto"/>
-                <a:ea typeface="Roboto"/>
-                <a:cs typeface="Roboto"/>
-                <a:sym typeface="Roboto"/>
-              </a:rPr>
-              <a:t>y_train</a:t>
-            </a:r>
-            <a:r>
-              <a:rPr lang="en" sz="1200">
-                <a:solidFill>
-                  <a:srgbClr val="374151"/>
-                </a:solidFill>
-                <a:latin typeface="Roboto"/>
-                <a:ea typeface="Roboto"/>
-                <a:cs typeface="Roboto"/>
-                <a:sym typeface="Roboto"/>
-              </a:rPr>
-              <a:t> and </a:t>
-            </a:r>
-            <a:r>
-              <a:rPr lang="en" sz="1050">
-                <a:solidFill>
-                  <a:srgbClr val="374151"/>
-                </a:solidFill>
-                <a:latin typeface="Roboto"/>
-                <a:ea typeface="Roboto"/>
-                <a:cs typeface="Roboto"/>
-                <a:sym typeface="Roboto"/>
-              </a:rPr>
-              <a:t>y_test</a:t>
-            </a:r>
-            <a:r>
-              <a:rPr lang="en" sz="1200">
-                <a:solidFill>
-                  <a:srgbClr val="374151"/>
-                </a:solidFill>
-                <a:latin typeface="Roboto"/>
-                <a:ea typeface="Roboto"/>
-                <a:cs typeface="Roboto"/>
-                <a:sym typeface="Roboto"/>
-              </a:rPr>
-              <a:t>) is appropriate for regression (i.e., continuous values, not class labels).</a:t>
-            </a:r>
-            <a:endParaRPr sz="1200">
-              <a:solidFill>
-                <a:srgbClr val="374151"/>
-              </a:solidFill>
-              <a:latin typeface="Roboto"/>
-              <a:ea typeface="Roboto"/>
-              <a:cs typeface="Roboto"/>
-              <a:sym typeface="Roboto"/>
-            </a:endParaRPr>
-          </a:p>
-          <a:p>
-            <a:pPr indent="-228600" lvl="0" marL="457200" rtl="0" algn="l">
-              <a:spcBef>
-                <a:spcPts val="0"/>
-              </a:spcBef>
-              <a:spcAft>
-                <a:spcPts val="0"/>
-              </a:spcAft>
-              <a:buClr>
-                <a:srgbClr val="374151"/>
-              </a:buClr>
-              <a:buSzPct val="100000"/>
-              <a:buFont typeface="Roboto"/>
-              <a:buNone/>
-            </a:pPr>
-            <a:r>
-              <a:rPr lang="en" sz="1200">
-                <a:solidFill>
-                  <a:srgbClr val="374151"/>
-                </a:solidFill>
-                <a:latin typeface="Roboto"/>
-                <a:ea typeface="Roboto"/>
-                <a:cs typeface="Roboto"/>
-                <a:sym typeface="Roboto"/>
-              </a:rPr>
-              <a:t>Evaluation Metric: Replace accuracy calculation with a regression metric, such as Mean Absolute Error or Root Mean Squared Error.</a:t>
-            </a:r>
-            <a:endParaRPr sz="2200"/>
+            <a:endParaRPr sz="2400"/>
           </a:p>
         </p:txBody>
       </p:sp>
@@ -11864,7 +11677,7 @@
   <p:cSld>
     <p:spTree>
       <p:nvGrpSpPr>
-        <p:cNvPr id="209" name="Shape 209"/>
+        <p:cNvPr id="210" name="Shape 210"/>
         <p:cNvGrpSpPr/>
         <p:nvPr/>
       </p:nvGrpSpPr>
@@ -11878,7 +11691,7 @@
       </p:grpSpPr>
       <p:sp>
         <p:nvSpPr>
-          <p:cNvPr id="210" name="Google Shape;210;p32"/>
+          <p:cNvPr id="211" name="Google Shape;211;p32"/>
           <p:cNvSpPr txBox="1"/>
           <p:nvPr>
             <p:ph type="title"/>
@@ -11928,7 +11741,7 @@
       </p:sp>
       <p:sp>
         <p:nvSpPr>
-          <p:cNvPr id="211" name="Google Shape;211;p32"/>
+          <p:cNvPr id="212" name="Google Shape;212;p32"/>
           <p:cNvSpPr txBox="1"/>
           <p:nvPr>
             <p:ph idx="1" type="body"/>
@@ -12053,7 +11866,7 @@
       </p:sp>
       <p:sp>
         <p:nvSpPr>
-          <p:cNvPr id="212" name="Google Shape;212;p32"/>
+          <p:cNvPr id="213" name="Google Shape;213;p32"/>
           <p:cNvSpPr txBox="1"/>
           <p:nvPr>
             <p:ph idx="12" type="sldNum"/>
@@ -12093,7 +11906,7 @@
       </p:sp>
       <p:pic>
         <p:nvPicPr>
-          <p:cNvPr id="213" name="Google Shape;213;p32"/>
+          <p:cNvPr id="214" name="Google Shape;214;p32"/>
           <p:cNvPicPr preferRelativeResize="0"/>
           <p:nvPr/>
         </p:nvPicPr>
@@ -12132,7 +11945,7 @@
   <p:cSld>
     <p:spTree>
       <p:nvGrpSpPr>
-        <p:cNvPr id="217" name="Shape 217"/>
+        <p:cNvPr id="218" name="Shape 218"/>
         <p:cNvGrpSpPr/>
         <p:nvPr/>
       </p:nvGrpSpPr>
@@ -12146,7 +11959,7 @@
       </p:grpSpPr>
       <p:sp>
         <p:nvSpPr>
-          <p:cNvPr id="218" name="Google Shape;218;p33"/>
+          <p:cNvPr id="219" name="Google Shape;219;p33"/>
           <p:cNvSpPr txBox="1"/>
           <p:nvPr>
             <p:ph idx="12" type="sldNum"/>
@@ -12186,7 +11999,7 @@
       </p:sp>
       <p:pic>
         <p:nvPicPr>
-          <p:cNvPr id="219" name="Google Shape;219;p33"/>
+          <p:cNvPr id="220" name="Google Shape;220;p33"/>
           <p:cNvPicPr preferRelativeResize="0"/>
           <p:nvPr/>
         </p:nvPicPr>
@@ -12214,7 +12027,7 @@
       </p:pic>
       <p:sp>
         <p:nvSpPr>
-          <p:cNvPr id="220" name="Google Shape;220;p33"/>
+          <p:cNvPr id="221" name="Google Shape;221;p33"/>
           <p:cNvSpPr txBox="1"/>
           <p:nvPr/>
         </p:nvSpPr>
@@ -12321,7 +12134,7 @@
   <p:cSld>
     <p:spTree>
       <p:nvGrpSpPr>
-        <p:cNvPr id="224" name="Shape 224"/>
+        <p:cNvPr id="225" name="Shape 225"/>
         <p:cNvGrpSpPr/>
         <p:nvPr/>
       </p:nvGrpSpPr>
@@ -12335,7 +12148,7 @@
       </p:grpSpPr>
       <p:sp>
         <p:nvSpPr>
-          <p:cNvPr id="225" name="Google Shape;225;p34"/>
+          <p:cNvPr id="226" name="Google Shape;226;p34"/>
           <p:cNvSpPr txBox="1"/>
           <p:nvPr>
             <p:ph type="title"/>
@@ -12385,7 +12198,7 @@
       </p:sp>
       <p:sp>
         <p:nvSpPr>
-          <p:cNvPr id="226" name="Google Shape;226;p34"/>
+          <p:cNvPr id="227" name="Google Shape;227;p34"/>
           <p:cNvSpPr txBox="1"/>
           <p:nvPr>
             <p:ph idx="1" type="body"/>
@@ -12717,7 +12530,7 @@
       </p:sp>
       <p:sp>
         <p:nvSpPr>
-          <p:cNvPr id="227" name="Google Shape;227;p34"/>
+          <p:cNvPr id="228" name="Google Shape;228;p34"/>
           <p:cNvSpPr txBox="1"/>
           <p:nvPr>
             <p:ph idx="12" type="sldNum"/>
@@ -12768,7 +12581,7 @@
   <p:cSld>
     <p:spTree>
       <p:nvGrpSpPr>
-        <p:cNvPr id="231" name="Shape 231"/>
+        <p:cNvPr id="232" name="Shape 232"/>
         <p:cNvGrpSpPr/>
         <p:nvPr/>
       </p:nvGrpSpPr>
@@ -12782,7 +12595,7 @@
       </p:grpSpPr>
       <p:sp>
         <p:nvSpPr>
-          <p:cNvPr id="232" name="Google Shape;232;p35"/>
+          <p:cNvPr id="233" name="Google Shape;233;p35"/>
           <p:cNvSpPr txBox="1"/>
           <p:nvPr>
             <p:ph type="title"/>
@@ -12832,7 +12645,7 @@
       </p:sp>
       <p:sp>
         <p:nvSpPr>
-          <p:cNvPr id="233" name="Google Shape;233;p35"/>
+          <p:cNvPr id="234" name="Google Shape;234;p35"/>
           <p:cNvSpPr txBox="1"/>
           <p:nvPr>
             <p:ph idx="1" type="body"/>
@@ -12987,7 +12800,7 @@
       </p:sp>
       <p:sp>
         <p:nvSpPr>
-          <p:cNvPr id="234" name="Google Shape;234;p35"/>
+          <p:cNvPr id="235" name="Google Shape;235;p35"/>
           <p:cNvSpPr txBox="1"/>
           <p:nvPr>
             <p:ph idx="12" type="sldNum"/>
@@ -13027,7 +12840,7 @@
       </p:sp>
       <p:pic>
         <p:nvPicPr>
-          <p:cNvPr id="235" name="Google Shape;235;p35"/>
+          <p:cNvPr id="236" name="Google Shape;236;p35"/>
           <p:cNvPicPr preferRelativeResize="0"/>
           <p:nvPr/>
         </p:nvPicPr>
@@ -13066,7 +12879,7 @@
   <p:cSld>
     <p:spTree>
       <p:nvGrpSpPr>
-        <p:cNvPr id="239" name="Shape 239"/>
+        <p:cNvPr id="240" name="Shape 240"/>
         <p:cNvGrpSpPr/>
         <p:nvPr/>
       </p:nvGrpSpPr>
@@ -13080,7 +12893,7 @@
       </p:grpSpPr>
       <p:sp>
         <p:nvSpPr>
-          <p:cNvPr id="240" name="Google Shape;240;p36"/>
+          <p:cNvPr id="241" name="Google Shape;241;p36"/>
           <p:cNvSpPr txBox="1"/>
           <p:nvPr>
             <p:ph type="title"/>
@@ -13130,7 +12943,7 @@
       </p:sp>
       <p:sp>
         <p:nvSpPr>
-          <p:cNvPr id="241" name="Google Shape;241;p36"/>
+          <p:cNvPr id="242" name="Google Shape;242;p36"/>
           <p:cNvSpPr txBox="1"/>
           <p:nvPr>
             <p:ph idx="1" type="body"/>
@@ -13351,7 +13164,7 @@
       </p:sp>
       <p:sp>
         <p:nvSpPr>
-          <p:cNvPr id="242" name="Google Shape;242;p36"/>
+          <p:cNvPr id="243" name="Google Shape;243;p36"/>
           <p:cNvSpPr txBox="1"/>
           <p:nvPr>
             <p:ph idx="12" type="sldNum"/>
@@ -13391,7 +13204,7 @@
       </p:sp>
       <p:pic>
         <p:nvPicPr>
-          <p:cNvPr id="243" name="Google Shape;243;p36"/>
+          <p:cNvPr id="244" name="Google Shape;244;p36"/>
           <p:cNvPicPr preferRelativeResize="0"/>
           <p:nvPr/>
         </p:nvPicPr>
@@ -13419,7 +13232,7 @@
       </p:pic>
       <p:pic>
         <p:nvPicPr>
-          <p:cNvPr id="244" name="Google Shape;244;p36"/>
+          <p:cNvPr id="245" name="Google Shape;245;p36"/>
           <p:cNvPicPr preferRelativeResize="0"/>
           <p:nvPr/>
         </p:nvPicPr>
@@ -13445,6 +13258,548 @@
           </a:ln>
         </p:spPr>
       </p:pic>
+    </p:spTree>
+  </p:cSld>
+  <p:clrMapOvr>
+    <a:masterClrMapping/>
+  </p:clrMapOvr>
+</p:sld>
+</file>
+
+<file path=ppt/slides/slide25.xml><?xml version="1.0" encoding="utf-8"?>
+<p:sld xmlns:a="http://schemas.openxmlformats.org/drawingml/2006/main" xmlns:r="http://schemas.openxmlformats.org/officeDocument/2006/relationships" xmlns:mc="http://schemas.openxmlformats.org/markup-compatibility/2006" xmlns:mv="urn:schemas-microsoft-com:mac:vml" xmlns:p="http://schemas.openxmlformats.org/presentationml/2006/main" xmlns:c="http://schemas.openxmlformats.org/drawingml/2006/chart" xmlns:dgm="http://schemas.openxmlformats.org/drawingml/2006/diagram" xmlns:o="urn:schemas-microsoft-com:office:office" xmlns:v="urn:schemas-microsoft-com:vml" xmlns:pvml="urn:schemas-microsoft-com:office:powerpoint" xmlns:com="http://schemas.openxmlformats.org/drawingml/2006/compatibility" xmlns:p14="http://schemas.microsoft.com/office/powerpoint/2010/main" xmlns:p15="http://schemas.microsoft.com/office/powerpoint/2012/main" xmlns:ahyp="http://schemas.microsoft.com/office/drawing/2018/hyperlinkcolor">
+  <p:cSld>
+    <p:spTree>
+      <p:nvGrpSpPr>
+        <p:cNvPr id="249" name="Shape 249"/>
+        <p:cNvGrpSpPr/>
+        <p:nvPr/>
+      </p:nvGrpSpPr>
+      <p:grpSpPr>
+        <a:xfrm>
+          <a:off x="0" y="0"/>
+          <a:ext cx="0" cy="0"/>
+          <a:chOff x="0" y="0"/>
+          <a:chExt cx="0" cy="0"/>
+        </a:xfrm>
+      </p:grpSpPr>
+      <p:sp>
+        <p:nvSpPr>
+          <p:cNvPr id="250" name="Google Shape;250;p37"/>
+          <p:cNvSpPr txBox="1"/>
+          <p:nvPr>
+            <p:ph type="title"/>
+          </p:nvPr>
+        </p:nvSpPr>
+        <p:spPr>
+          <a:xfrm>
+            <a:off x="311700" y="593367"/>
+            <a:ext cx="8520600" cy="763500"/>
+          </a:xfrm>
+          <a:prstGeom prst="rect">
+            <a:avLst/>
+          </a:prstGeom>
+        </p:spPr>
+        <p:txBody>
+          <a:bodyPr anchorCtr="0" anchor="t" bIns="91425" lIns="91425" spcFirstLastPara="1" rIns="91425" wrap="square" tIns="91425">
+            <a:normAutofit/>
+          </a:bodyPr>
+          <a:lstStyle/>
+          <a:p>
+            <a:pPr indent="0" lvl="0" marL="0" rtl="0" algn="l">
+              <a:spcBef>
+                <a:spcPts val="0"/>
+              </a:spcBef>
+              <a:spcAft>
+                <a:spcPts val="0"/>
+              </a:spcAft>
+              <a:buNone/>
+            </a:pPr>
+            <a:r>
+              <a:rPr lang="en">
+                <a:latin typeface="Playfair Display"/>
+                <a:ea typeface="Playfair Display"/>
+                <a:cs typeface="Playfair Display"/>
+                <a:sym typeface="Playfair Display"/>
+              </a:rPr>
+              <a:t>Discussion</a:t>
+            </a:r>
+            <a:endParaRPr>
+              <a:latin typeface="Playfair Display"/>
+              <a:ea typeface="Playfair Display"/>
+              <a:cs typeface="Playfair Display"/>
+              <a:sym typeface="Playfair Display"/>
+            </a:endParaRPr>
+          </a:p>
+        </p:txBody>
+      </p:sp>
+      <p:sp>
+        <p:nvSpPr>
+          <p:cNvPr id="251" name="Google Shape;251;p37"/>
+          <p:cNvSpPr txBox="1"/>
+          <p:nvPr>
+            <p:ph idx="1" type="body"/>
+          </p:nvPr>
+        </p:nvSpPr>
+        <p:spPr>
+          <a:xfrm>
+            <a:off x="311700" y="1536625"/>
+            <a:ext cx="8520600" cy="4864800"/>
+          </a:xfrm>
+          <a:prstGeom prst="rect">
+            <a:avLst/>
+          </a:prstGeom>
+        </p:spPr>
+        <p:txBody>
+          <a:bodyPr anchorCtr="0" anchor="t" bIns="91425" lIns="91425" spcFirstLastPara="1" rIns="91425" wrap="square" tIns="91425">
+            <a:normAutofit fontScale="25000" lnSpcReduction="20000"/>
+          </a:bodyPr>
+          <a:lstStyle/>
+          <a:p>
+            <a:pPr indent="-357804" lvl="0" marL="457200" rtl="0" algn="l">
+              <a:lnSpc>
+                <a:spcPct val="150000"/>
+              </a:lnSpc>
+              <a:spcBef>
+                <a:spcPts val="0"/>
+              </a:spcBef>
+              <a:spcAft>
+                <a:spcPts val="0"/>
+              </a:spcAft>
+              <a:buSzPct val="100000"/>
+              <a:buFont typeface="Roboto"/>
+              <a:buChar char="●"/>
+            </a:pPr>
+            <a:r>
+              <a:rPr lang="en" sz="8138">
+                <a:latin typeface="Roboto"/>
+                <a:ea typeface="Roboto"/>
+                <a:cs typeface="Roboto"/>
+                <a:sym typeface="Roboto"/>
+              </a:rPr>
+              <a:t>Bayesian NNs are simple to implement and extremely </a:t>
+            </a:r>
+            <a:r>
+              <a:rPr lang="en" sz="8138">
+                <a:latin typeface="Roboto"/>
+                <a:ea typeface="Roboto"/>
+                <a:cs typeface="Roboto"/>
+                <a:sym typeface="Roboto"/>
+              </a:rPr>
+              <a:t>powerful</a:t>
+            </a:r>
+            <a:r>
+              <a:rPr lang="en" sz="8138">
+                <a:latin typeface="Roboto"/>
+                <a:ea typeface="Roboto"/>
+                <a:cs typeface="Roboto"/>
+                <a:sym typeface="Roboto"/>
+              </a:rPr>
+              <a:t> in that they give a model </a:t>
+            </a:r>
+            <a:r>
+              <a:rPr b="1" lang="en" sz="8138">
+                <a:latin typeface="Roboto"/>
+                <a:ea typeface="Roboto"/>
+                <a:cs typeface="Roboto"/>
+                <a:sym typeface="Roboto"/>
+              </a:rPr>
+              <a:t>awareness</a:t>
+            </a:r>
+            <a:endParaRPr b="1" sz="8138">
+              <a:latin typeface="Roboto"/>
+              <a:ea typeface="Roboto"/>
+              <a:cs typeface="Roboto"/>
+              <a:sym typeface="Roboto"/>
+            </a:endParaRPr>
+          </a:p>
+          <a:p>
+            <a:pPr indent="-357804" lvl="1" marL="914400" rtl="0" algn="l">
+              <a:lnSpc>
+                <a:spcPct val="150000"/>
+              </a:lnSpc>
+              <a:spcBef>
+                <a:spcPts val="0"/>
+              </a:spcBef>
+              <a:spcAft>
+                <a:spcPts val="0"/>
+              </a:spcAft>
+              <a:buSzPct val="100000"/>
+              <a:buFont typeface="Roboto"/>
+              <a:buChar char="○"/>
+            </a:pPr>
+            <a:r>
+              <a:rPr lang="en" sz="8138">
+                <a:latin typeface="Roboto"/>
+                <a:ea typeface="Roboto"/>
+                <a:cs typeface="Roboto"/>
+                <a:sym typeface="Roboto"/>
+              </a:rPr>
+              <a:t>Computationally intensive and slow</a:t>
+            </a:r>
+            <a:endParaRPr sz="8138">
+              <a:latin typeface="Roboto"/>
+              <a:ea typeface="Roboto"/>
+              <a:cs typeface="Roboto"/>
+              <a:sym typeface="Roboto"/>
+            </a:endParaRPr>
+          </a:p>
+          <a:p>
+            <a:pPr indent="-357804" lvl="2" marL="1371600" rtl="0" algn="l">
+              <a:lnSpc>
+                <a:spcPct val="150000"/>
+              </a:lnSpc>
+              <a:spcBef>
+                <a:spcPts val="0"/>
+              </a:spcBef>
+              <a:spcAft>
+                <a:spcPts val="0"/>
+              </a:spcAft>
+              <a:buSzPct val="100000"/>
+              <a:buFont typeface="Roboto"/>
+              <a:buChar char="■"/>
+            </a:pPr>
+            <a:r>
+              <a:rPr lang="en" sz="8138" u="sng">
+                <a:solidFill>
+                  <a:schemeClr val="hlink"/>
+                </a:solidFill>
+                <a:latin typeface="Roboto"/>
+                <a:ea typeface="Roboto"/>
+                <a:cs typeface="Roboto"/>
+                <a:sym typeface="Roboto"/>
+                <a:hlinkClick r:id="rId3"/>
+              </a:rPr>
+              <a:t>https://arxiv.org/abs/1506.02142</a:t>
+            </a:r>
+            <a:endParaRPr sz="8138">
+              <a:latin typeface="Roboto"/>
+              <a:ea typeface="Roboto"/>
+              <a:cs typeface="Roboto"/>
+              <a:sym typeface="Roboto"/>
+            </a:endParaRPr>
+          </a:p>
+          <a:p>
+            <a:pPr indent="-357804" lvl="2" marL="1371600" rtl="0" algn="l">
+              <a:lnSpc>
+                <a:spcPct val="150000"/>
+              </a:lnSpc>
+              <a:spcBef>
+                <a:spcPts val="0"/>
+              </a:spcBef>
+              <a:spcAft>
+                <a:spcPts val="0"/>
+              </a:spcAft>
+              <a:buSzPct val="100000"/>
+              <a:buFont typeface="Roboto"/>
+              <a:buChar char="■"/>
+            </a:pPr>
+            <a:r>
+              <a:rPr lang="en" sz="8138" u="sng">
+                <a:solidFill>
+                  <a:schemeClr val="hlink"/>
+                </a:solidFill>
+                <a:latin typeface="Roboto"/>
+                <a:ea typeface="Roboto"/>
+                <a:cs typeface="Roboto"/>
+                <a:sym typeface="Roboto"/>
+                <a:hlinkClick r:id="rId4"/>
+              </a:rPr>
+              <a:t>https://arxiv.org/abs/1612.01474</a:t>
+            </a:r>
+            <a:endParaRPr sz="8138">
+              <a:latin typeface="Roboto"/>
+              <a:ea typeface="Roboto"/>
+              <a:cs typeface="Roboto"/>
+              <a:sym typeface="Roboto"/>
+            </a:endParaRPr>
+          </a:p>
+          <a:p>
+            <a:pPr indent="-357804" lvl="1" marL="914400" rtl="0" algn="l">
+              <a:lnSpc>
+                <a:spcPct val="150000"/>
+              </a:lnSpc>
+              <a:spcBef>
+                <a:spcPts val="0"/>
+              </a:spcBef>
+              <a:spcAft>
+                <a:spcPts val="0"/>
+              </a:spcAft>
+              <a:buSzPct val="100000"/>
+              <a:buFont typeface="Roboto"/>
+              <a:buChar char="○"/>
+            </a:pPr>
+            <a:r>
+              <a:rPr lang="en" sz="8138">
+                <a:latin typeface="Roboto"/>
+                <a:ea typeface="Roboto"/>
+                <a:cs typeface="Roboto"/>
+                <a:sym typeface="Roboto"/>
+              </a:rPr>
+              <a:t>Dropout + Deep Ensembles</a:t>
+            </a:r>
+            <a:endParaRPr sz="8138">
+              <a:latin typeface="Roboto"/>
+              <a:ea typeface="Roboto"/>
+              <a:cs typeface="Roboto"/>
+              <a:sym typeface="Roboto"/>
+            </a:endParaRPr>
+          </a:p>
+          <a:p>
+            <a:pPr indent="-357804" lvl="0" marL="457200" rtl="0" algn="l">
+              <a:lnSpc>
+                <a:spcPct val="150000"/>
+              </a:lnSpc>
+              <a:spcBef>
+                <a:spcPts val="0"/>
+              </a:spcBef>
+              <a:spcAft>
+                <a:spcPts val="0"/>
+              </a:spcAft>
+              <a:buSzPct val="100000"/>
+              <a:buFont typeface="Roboto"/>
+              <a:buChar char="●"/>
+            </a:pPr>
+            <a:r>
+              <a:rPr lang="en" sz="8138">
+                <a:latin typeface="Roboto"/>
+                <a:ea typeface="Roboto"/>
+                <a:cs typeface="Roboto"/>
+                <a:sym typeface="Roboto"/>
+              </a:rPr>
+              <a:t>Extend to different architectures and layers</a:t>
+            </a:r>
+            <a:endParaRPr sz="8138">
+              <a:latin typeface="Roboto"/>
+              <a:ea typeface="Roboto"/>
+              <a:cs typeface="Roboto"/>
+              <a:sym typeface="Roboto"/>
+            </a:endParaRPr>
+          </a:p>
+          <a:p>
+            <a:pPr indent="-357804" lvl="1" marL="914400" rtl="0" algn="l">
+              <a:lnSpc>
+                <a:spcPct val="150000"/>
+              </a:lnSpc>
+              <a:spcBef>
+                <a:spcPts val="0"/>
+              </a:spcBef>
+              <a:spcAft>
+                <a:spcPts val="0"/>
+              </a:spcAft>
+              <a:buSzPct val="100000"/>
+              <a:buFont typeface="Roboto"/>
+              <a:buChar char="○"/>
+            </a:pPr>
+            <a:r>
+              <a:rPr lang="en" sz="8138">
+                <a:latin typeface="Roboto"/>
+                <a:ea typeface="Roboto"/>
+                <a:cs typeface="Roboto"/>
+                <a:sym typeface="Roboto"/>
+              </a:rPr>
+              <a:t>CNNs, RNNs, etc.</a:t>
+            </a:r>
+            <a:endParaRPr sz="8138">
+              <a:latin typeface="Roboto"/>
+              <a:ea typeface="Roboto"/>
+              <a:cs typeface="Roboto"/>
+              <a:sym typeface="Roboto"/>
+            </a:endParaRPr>
+          </a:p>
+          <a:p>
+            <a:pPr indent="-357804" lvl="0" marL="457200" rtl="0" algn="l">
+              <a:lnSpc>
+                <a:spcPct val="150000"/>
+              </a:lnSpc>
+              <a:spcBef>
+                <a:spcPts val="0"/>
+              </a:spcBef>
+              <a:spcAft>
+                <a:spcPts val="0"/>
+              </a:spcAft>
+              <a:buSzPct val="100000"/>
+              <a:buFont typeface="Roboto"/>
+              <a:buChar char="●"/>
+            </a:pPr>
+            <a:r>
+              <a:rPr lang="en" sz="8138">
+                <a:latin typeface="Roboto"/>
+                <a:ea typeface="Roboto"/>
+                <a:cs typeface="Roboto"/>
+                <a:sym typeface="Roboto"/>
+              </a:rPr>
+              <a:t>Hyperparameter optimizations</a:t>
+            </a:r>
+            <a:endParaRPr sz="8138">
+              <a:latin typeface="Roboto"/>
+              <a:ea typeface="Roboto"/>
+              <a:cs typeface="Roboto"/>
+              <a:sym typeface="Roboto"/>
+            </a:endParaRPr>
+          </a:p>
+          <a:p>
+            <a:pPr indent="0" lvl="0" marL="0" rtl="0" algn="l">
+              <a:spcBef>
+                <a:spcPts val="1200"/>
+              </a:spcBef>
+              <a:spcAft>
+                <a:spcPts val="0"/>
+              </a:spcAft>
+              <a:buNone/>
+            </a:pPr>
+            <a:r>
+              <a:t/>
+            </a:r>
+            <a:endParaRPr b="1" sz="2000">
+              <a:latin typeface="Roboto"/>
+              <a:ea typeface="Roboto"/>
+              <a:cs typeface="Roboto"/>
+              <a:sym typeface="Roboto"/>
+            </a:endParaRPr>
+          </a:p>
+          <a:p>
+            <a:pPr indent="0" lvl="0" marL="0" rtl="0" algn="l">
+              <a:spcBef>
+                <a:spcPts val="1200"/>
+              </a:spcBef>
+              <a:spcAft>
+                <a:spcPts val="0"/>
+              </a:spcAft>
+              <a:buNone/>
+            </a:pPr>
+            <a:r>
+              <a:t/>
+            </a:r>
+            <a:endParaRPr b="1" sz="2000">
+              <a:latin typeface="Roboto"/>
+              <a:ea typeface="Roboto"/>
+              <a:cs typeface="Roboto"/>
+              <a:sym typeface="Roboto"/>
+            </a:endParaRPr>
+          </a:p>
+          <a:p>
+            <a:pPr indent="0" lvl="0" marL="0" rtl="0" algn="l">
+              <a:spcBef>
+                <a:spcPts val="1200"/>
+              </a:spcBef>
+              <a:spcAft>
+                <a:spcPts val="0"/>
+              </a:spcAft>
+              <a:buNone/>
+            </a:pPr>
+            <a:r>
+              <a:t/>
+            </a:r>
+            <a:endParaRPr b="1" sz="2000">
+              <a:latin typeface="Roboto"/>
+              <a:ea typeface="Roboto"/>
+              <a:cs typeface="Roboto"/>
+              <a:sym typeface="Roboto"/>
+            </a:endParaRPr>
+          </a:p>
+          <a:p>
+            <a:pPr indent="0" lvl="0" marL="0" rtl="0" algn="l">
+              <a:spcBef>
+                <a:spcPts val="1200"/>
+              </a:spcBef>
+              <a:spcAft>
+                <a:spcPts val="0"/>
+              </a:spcAft>
+              <a:buNone/>
+            </a:pPr>
+            <a:r>
+              <a:t/>
+            </a:r>
+            <a:endParaRPr b="1" sz="2000">
+              <a:latin typeface="Roboto"/>
+              <a:ea typeface="Roboto"/>
+              <a:cs typeface="Roboto"/>
+              <a:sym typeface="Roboto"/>
+            </a:endParaRPr>
+          </a:p>
+          <a:p>
+            <a:pPr indent="0" lvl="0" marL="0" rtl="0" algn="l">
+              <a:spcBef>
+                <a:spcPts val="1200"/>
+              </a:spcBef>
+              <a:spcAft>
+                <a:spcPts val="0"/>
+              </a:spcAft>
+              <a:buNone/>
+            </a:pPr>
+            <a:r>
+              <a:t/>
+            </a:r>
+            <a:endParaRPr b="1" sz="2000">
+              <a:latin typeface="Roboto"/>
+              <a:ea typeface="Roboto"/>
+              <a:cs typeface="Roboto"/>
+              <a:sym typeface="Roboto"/>
+            </a:endParaRPr>
+          </a:p>
+          <a:p>
+            <a:pPr indent="0" lvl="0" marL="0" rtl="0" algn="l">
+              <a:spcBef>
+                <a:spcPts val="1200"/>
+              </a:spcBef>
+              <a:spcAft>
+                <a:spcPts val="1200"/>
+              </a:spcAft>
+              <a:buNone/>
+            </a:pPr>
+            <a:r>
+              <a:t/>
+            </a:r>
+            <a:endParaRPr b="1" sz="2000">
+              <a:latin typeface="Roboto"/>
+              <a:ea typeface="Roboto"/>
+              <a:cs typeface="Roboto"/>
+              <a:sym typeface="Roboto"/>
+            </a:endParaRPr>
+          </a:p>
+        </p:txBody>
+      </p:sp>
+      <p:sp>
+        <p:nvSpPr>
+          <p:cNvPr id="252" name="Google Shape;252;p37"/>
+          <p:cNvSpPr txBox="1"/>
+          <p:nvPr>
+            <p:ph idx="12" type="sldNum"/>
+          </p:nvPr>
+        </p:nvSpPr>
+        <p:spPr>
+          <a:xfrm>
+            <a:off x="8472458" y="6217622"/>
+            <a:ext cx="548700" cy="524700"/>
+          </a:xfrm>
+          <a:prstGeom prst="rect">
+            <a:avLst/>
+          </a:prstGeom>
+        </p:spPr>
+        <p:txBody>
+          <a:bodyPr anchorCtr="0" anchor="ctr" bIns="91425" lIns="91425" spcFirstLastPara="1" rIns="91425" wrap="square" tIns="91425">
+            <a:normAutofit/>
+          </a:bodyPr>
+          <a:lstStyle/>
+          <a:p>
+            <a:pPr indent="0" lvl="0" marL="0" rtl="0" algn="r">
+              <a:spcBef>
+                <a:spcPts val="0"/>
+              </a:spcBef>
+              <a:spcAft>
+                <a:spcPts val="0"/>
+              </a:spcAft>
+              <a:buNone/>
+            </a:pPr>
+            <a:fld id="{00000000-1234-1234-1234-123412341234}" type="slidenum">
+              <a:rPr lang="en"/>
+              <a:t>‹#›</a:t>
+            </a:fld>
+            <a:endParaRPr/>
+          </a:p>
+        </p:txBody>
+      </p:sp>
     </p:spTree>
   </p:cSld>
   <p:clrMapOvr>

</xml_diff>

<commit_message>
fix axes on graph
</commit_message>
<xml_diff>
--- a/Bayesian Neural Network Presentation.pptx
+++ b/Bayesian Neural Network Presentation.pptx
@@ -882,7 +882,7 @@
   <p:cSld>
     <p:spTree>
       <p:nvGrpSpPr>
-        <p:cNvPr id="123" name="Shape 123"/>
+        <p:cNvPr id="127" name="Shape 127"/>
         <p:cNvGrpSpPr/>
         <p:nvPr/>
       </p:nvGrpSpPr>
@@ -896,7 +896,7 @@
       </p:grpSpPr>
       <p:sp>
         <p:nvSpPr>
-          <p:cNvPr id="124" name="Google Shape;124;g29fb69b0a6e_0_106:notes"/>
+          <p:cNvPr id="128" name="Google Shape;128;g29fb69b0a6e_0_106:notes"/>
           <p:cNvSpPr/>
           <p:nvPr>
             <p:ph idx="2" type="sldImg"/>
@@ -931,7 +931,7 @@
       </p:sp>
       <p:sp>
         <p:nvSpPr>
-          <p:cNvPr id="125" name="Google Shape;125;g29fb69b0a6e_0_106:notes"/>
+          <p:cNvPr id="129" name="Google Shape;129;g29fb69b0a6e_0_106:notes"/>
           <p:cNvSpPr txBox="1"/>
           <p:nvPr>
             <p:ph idx="1" type="body"/>
@@ -981,7 +981,7 @@
   <p:cSld>
     <p:spTree>
       <p:nvGrpSpPr>
-        <p:cNvPr id="129" name="Shape 129"/>
+        <p:cNvPr id="133" name="Shape 133"/>
         <p:cNvGrpSpPr/>
         <p:nvPr/>
       </p:nvGrpSpPr>
@@ -995,7 +995,7 @@
       </p:grpSpPr>
       <p:sp>
         <p:nvSpPr>
-          <p:cNvPr id="130" name="Google Shape;130;g29fb69b0a6e_0_99:notes"/>
+          <p:cNvPr id="134" name="Google Shape;134;g29fb69b0a6e_0_99:notes"/>
           <p:cNvSpPr/>
           <p:nvPr>
             <p:ph idx="2" type="sldImg"/>
@@ -1030,7 +1030,7 @@
       </p:sp>
       <p:sp>
         <p:nvSpPr>
-          <p:cNvPr id="131" name="Google Shape;131;g29fb69b0a6e_0_99:notes"/>
+          <p:cNvPr id="135" name="Google Shape;135;g29fb69b0a6e_0_99:notes"/>
           <p:cNvSpPr txBox="1"/>
           <p:nvPr>
             <p:ph idx="1" type="body"/>
@@ -1080,7 +1080,7 @@
   <p:cSld>
     <p:spTree>
       <p:nvGrpSpPr>
-        <p:cNvPr id="142" name="Shape 142"/>
+        <p:cNvPr id="146" name="Shape 146"/>
         <p:cNvGrpSpPr/>
         <p:nvPr/>
       </p:nvGrpSpPr>
@@ -1094,7 +1094,7 @@
       </p:grpSpPr>
       <p:sp>
         <p:nvSpPr>
-          <p:cNvPr id="143" name="Google Shape;143;g29fb69b0a6e_0_123:notes"/>
+          <p:cNvPr id="147" name="Google Shape;147;g29fb69b0a6e_0_123:notes"/>
           <p:cNvSpPr/>
           <p:nvPr>
             <p:ph idx="2" type="sldImg"/>
@@ -1129,7 +1129,7 @@
       </p:sp>
       <p:sp>
         <p:nvSpPr>
-          <p:cNvPr id="144" name="Google Shape;144;g29fb69b0a6e_0_123:notes"/>
+          <p:cNvPr id="148" name="Google Shape;148;g29fb69b0a6e_0_123:notes"/>
           <p:cNvSpPr txBox="1"/>
           <p:nvPr>
             <p:ph idx="1" type="body"/>
@@ -1179,7 +1179,7 @@
   <p:cSld>
     <p:spTree>
       <p:nvGrpSpPr>
-        <p:cNvPr id="151" name="Shape 151"/>
+        <p:cNvPr id="155" name="Shape 155"/>
         <p:cNvGrpSpPr/>
         <p:nvPr/>
       </p:nvGrpSpPr>
@@ -1193,7 +1193,7 @@
       </p:grpSpPr>
       <p:sp>
         <p:nvSpPr>
-          <p:cNvPr id="152" name="Google Shape;152;g255e78d319a_0_80:notes"/>
+          <p:cNvPr id="156" name="Google Shape;156;g255e78d319a_0_80:notes"/>
           <p:cNvSpPr/>
           <p:nvPr>
             <p:ph idx="2" type="sldImg"/>
@@ -1228,7 +1228,7 @@
       </p:sp>
       <p:sp>
         <p:nvSpPr>
-          <p:cNvPr id="153" name="Google Shape;153;g255e78d319a_0_80:notes"/>
+          <p:cNvPr id="157" name="Google Shape;157;g255e78d319a_0_80:notes"/>
           <p:cNvSpPr txBox="1"/>
           <p:nvPr>
             <p:ph idx="1" type="body"/>
@@ -1278,7 +1278,7 @@
   <p:cSld>
     <p:spTree>
       <p:nvGrpSpPr>
-        <p:cNvPr id="157" name="Shape 157"/>
+        <p:cNvPr id="161" name="Shape 161"/>
         <p:cNvGrpSpPr/>
         <p:nvPr/>
       </p:nvGrpSpPr>
@@ -1292,7 +1292,7 @@
       </p:grpSpPr>
       <p:sp>
         <p:nvSpPr>
-          <p:cNvPr id="158" name="Google Shape;158;g29fb69b0a6e_0_27:notes"/>
+          <p:cNvPr id="162" name="Google Shape;162;g29fb69b0a6e_0_27:notes"/>
           <p:cNvSpPr/>
           <p:nvPr>
             <p:ph idx="2" type="sldImg"/>
@@ -1327,7 +1327,7 @@
       </p:sp>
       <p:sp>
         <p:nvSpPr>
-          <p:cNvPr id="159" name="Google Shape;159;g29fb69b0a6e_0_27:notes"/>
+          <p:cNvPr id="163" name="Google Shape;163;g29fb69b0a6e_0_27:notes"/>
           <p:cNvSpPr txBox="1"/>
           <p:nvPr>
             <p:ph idx="1" type="body"/>
@@ -1377,7 +1377,7 @@
   <p:cSld>
     <p:spTree>
       <p:nvGrpSpPr>
-        <p:cNvPr id="166" name="Shape 166"/>
+        <p:cNvPr id="170" name="Shape 170"/>
         <p:cNvGrpSpPr/>
         <p:nvPr/>
       </p:nvGrpSpPr>
@@ -1391,7 +1391,7 @@
       </p:grpSpPr>
       <p:sp>
         <p:nvSpPr>
-          <p:cNvPr id="167" name="Google Shape;167;g29fb69b0a6e_0_143:notes"/>
+          <p:cNvPr id="171" name="Google Shape;171;g29fb69b0a6e_0_143:notes"/>
           <p:cNvSpPr/>
           <p:nvPr>
             <p:ph idx="2" type="sldImg"/>
@@ -1426,7 +1426,7 @@
       </p:sp>
       <p:sp>
         <p:nvSpPr>
-          <p:cNvPr id="168" name="Google Shape;168;g29fb69b0a6e_0_143:notes"/>
+          <p:cNvPr id="172" name="Google Shape;172;g29fb69b0a6e_0_143:notes"/>
           <p:cNvSpPr txBox="1"/>
           <p:nvPr>
             <p:ph idx="1" type="body"/>
@@ -1476,7 +1476,7 @@
   <p:cSld>
     <p:spTree>
       <p:nvGrpSpPr>
-        <p:cNvPr id="174" name="Shape 174"/>
+        <p:cNvPr id="178" name="Shape 178"/>
         <p:cNvGrpSpPr/>
         <p:nvPr/>
       </p:nvGrpSpPr>
@@ -1490,7 +1490,7 @@
       </p:grpSpPr>
       <p:sp>
         <p:nvSpPr>
-          <p:cNvPr id="175" name="Google Shape;175;g29fb69b0a6e_0_152:notes"/>
+          <p:cNvPr id="179" name="Google Shape;179;g29fb69b0a6e_0_152:notes"/>
           <p:cNvSpPr/>
           <p:nvPr>
             <p:ph idx="2" type="sldImg"/>
@@ -1525,7 +1525,7 @@
       </p:sp>
       <p:sp>
         <p:nvSpPr>
-          <p:cNvPr id="176" name="Google Shape;176;g29fb69b0a6e_0_152:notes"/>
+          <p:cNvPr id="180" name="Google Shape;180;g29fb69b0a6e_0_152:notes"/>
           <p:cNvSpPr txBox="1"/>
           <p:nvPr>
             <p:ph idx="1" type="body"/>
@@ -1575,7 +1575,7 @@
   <p:cSld>
     <p:spTree>
       <p:nvGrpSpPr>
-        <p:cNvPr id="182" name="Shape 182"/>
+        <p:cNvPr id="190" name="Shape 190"/>
         <p:cNvGrpSpPr/>
         <p:nvPr/>
       </p:nvGrpSpPr>
@@ -1589,7 +1589,7 @@
       </p:grpSpPr>
       <p:sp>
         <p:nvSpPr>
-          <p:cNvPr id="183" name="Google Shape;183;g29fb69b0a6e_0_161:notes"/>
+          <p:cNvPr id="191" name="Google Shape;191;g29fb69b0a6e_0_161:notes"/>
           <p:cNvSpPr/>
           <p:nvPr>
             <p:ph idx="2" type="sldImg"/>
@@ -1624,7 +1624,7 @@
       </p:sp>
       <p:sp>
         <p:nvSpPr>
-          <p:cNvPr id="184" name="Google Shape;184;g29fb69b0a6e_0_161:notes"/>
+          <p:cNvPr id="192" name="Google Shape;192;g29fb69b0a6e_0_161:notes"/>
           <p:cNvSpPr txBox="1"/>
           <p:nvPr>
             <p:ph idx="1" type="body"/>
@@ -1674,7 +1674,7 @@
   <p:cSld>
     <p:spTree>
       <p:nvGrpSpPr>
-        <p:cNvPr id="189" name="Shape 189"/>
+        <p:cNvPr id="197" name="Shape 197"/>
         <p:cNvGrpSpPr/>
         <p:nvPr/>
       </p:nvGrpSpPr>
@@ -1688,7 +1688,7 @@
       </p:grpSpPr>
       <p:sp>
         <p:nvSpPr>
-          <p:cNvPr id="190" name="Google Shape;190;g29fb69b0a6e_0_171:notes"/>
+          <p:cNvPr id="198" name="Google Shape;198;g29fb69b0a6e_0_171:notes"/>
           <p:cNvSpPr/>
           <p:nvPr>
             <p:ph idx="2" type="sldImg"/>
@@ -1723,7 +1723,7 @@
       </p:sp>
       <p:sp>
         <p:nvSpPr>
-          <p:cNvPr id="191" name="Google Shape;191;g29fb69b0a6e_0_171:notes"/>
+          <p:cNvPr id="199" name="Google Shape;199;g29fb69b0a6e_0_171:notes"/>
           <p:cNvSpPr txBox="1"/>
           <p:nvPr>
             <p:ph idx="1" type="body"/>
@@ -1773,7 +1773,7 @@
   <p:cSld>
     <p:spTree>
       <p:nvGrpSpPr>
-        <p:cNvPr id="198" name="Shape 198"/>
+        <p:cNvPr id="206" name="Shape 206"/>
         <p:cNvGrpSpPr/>
         <p:nvPr/>
       </p:nvGrpSpPr>
@@ -1787,7 +1787,7 @@
       </p:grpSpPr>
       <p:sp>
         <p:nvSpPr>
-          <p:cNvPr id="199" name="Google Shape;199;g29fb69b0a6e_0_180:notes"/>
+          <p:cNvPr id="207" name="Google Shape;207;g29fb69b0a6e_0_180:notes"/>
           <p:cNvSpPr/>
           <p:nvPr>
             <p:ph idx="2" type="sldImg"/>
@@ -1822,7 +1822,7 @@
       </p:sp>
       <p:sp>
         <p:nvSpPr>
-          <p:cNvPr id="200" name="Google Shape;200;g29fb69b0a6e_0_180:notes"/>
+          <p:cNvPr id="208" name="Google Shape;208;g29fb69b0a6e_0_180:notes"/>
           <p:cNvSpPr txBox="1"/>
           <p:nvPr>
             <p:ph idx="1" type="body"/>
@@ -1995,7 +1995,7 @@
   <p:cSld>
     <p:spTree>
       <p:nvGrpSpPr>
-        <p:cNvPr id="207" name="Shape 207"/>
+        <p:cNvPr id="215" name="Shape 215"/>
         <p:cNvGrpSpPr/>
         <p:nvPr/>
       </p:nvGrpSpPr>
@@ -2009,7 +2009,7 @@
       </p:grpSpPr>
       <p:sp>
         <p:nvSpPr>
-          <p:cNvPr id="208" name="Google Shape;208;g29fb69b0a6e_0_189:notes"/>
+          <p:cNvPr id="216" name="Google Shape;216;g29fb69b0a6e_0_189:notes"/>
           <p:cNvSpPr/>
           <p:nvPr>
             <p:ph idx="2" type="sldImg"/>
@@ -2044,7 +2044,7 @@
       </p:sp>
       <p:sp>
         <p:nvSpPr>
-          <p:cNvPr id="209" name="Google Shape;209;g29fb69b0a6e_0_189:notes"/>
+          <p:cNvPr id="217" name="Google Shape;217;g29fb69b0a6e_0_189:notes"/>
           <p:cNvSpPr txBox="1"/>
           <p:nvPr>
             <p:ph idx="1" type="body"/>
@@ -2094,7 +2094,7 @@
   <p:cSld>
     <p:spTree>
       <p:nvGrpSpPr>
-        <p:cNvPr id="215" name="Shape 215"/>
+        <p:cNvPr id="227" name="Shape 227"/>
         <p:cNvGrpSpPr/>
         <p:nvPr/>
       </p:nvGrpSpPr>
@@ -2108,7 +2108,7 @@
       </p:grpSpPr>
       <p:sp>
         <p:nvSpPr>
-          <p:cNvPr id="216" name="Google Shape;216;g29fb69b0a6e_0_21:notes"/>
+          <p:cNvPr id="228" name="Google Shape;228;g29fb69b0a6e_0_21:notes"/>
           <p:cNvSpPr/>
           <p:nvPr>
             <p:ph idx="2" type="sldImg"/>
@@ -2143,7 +2143,7 @@
       </p:sp>
       <p:sp>
         <p:nvSpPr>
-          <p:cNvPr id="217" name="Google Shape;217;g29fb69b0a6e_0_21:notes"/>
+          <p:cNvPr id="229" name="Google Shape;229;g29fb69b0a6e_0_21:notes"/>
           <p:cNvSpPr txBox="1"/>
           <p:nvPr>
             <p:ph idx="1" type="body"/>
@@ -2194,7 +2194,7 @@
   <p:cSld>
     <p:spTree>
       <p:nvGrpSpPr>
-        <p:cNvPr id="222" name="Shape 222"/>
+        <p:cNvPr id="234" name="Shape 234"/>
         <p:cNvGrpSpPr/>
         <p:nvPr/>
       </p:nvGrpSpPr>
@@ -2208,7 +2208,7 @@
       </p:grpSpPr>
       <p:sp>
         <p:nvSpPr>
-          <p:cNvPr id="223" name="Google Shape;223;g29fb69b0a6e_0_218:notes"/>
+          <p:cNvPr id="235" name="Google Shape;235;g29fb69b0a6e_0_218:notes"/>
           <p:cNvSpPr/>
           <p:nvPr>
             <p:ph idx="2" type="sldImg"/>
@@ -2243,7 +2243,7 @@
       </p:sp>
       <p:sp>
         <p:nvSpPr>
-          <p:cNvPr id="224" name="Google Shape;224;g29fb69b0a6e_0_218:notes"/>
+          <p:cNvPr id="236" name="Google Shape;236;g29fb69b0a6e_0_218:notes"/>
           <p:cNvSpPr txBox="1"/>
           <p:nvPr>
             <p:ph idx="1" type="body"/>
@@ -2293,7 +2293,7 @@
   <p:cSld>
     <p:spTree>
       <p:nvGrpSpPr>
-        <p:cNvPr id="229" name="Shape 229"/>
+        <p:cNvPr id="241" name="Shape 241"/>
         <p:cNvGrpSpPr/>
         <p:nvPr/>
       </p:nvGrpSpPr>
@@ -2307,7 +2307,7 @@
       </p:grpSpPr>
       <p:sp>
         <p:nvSpPr>
-          <p:cNvPr id="230" name="Google Shape;230;g29fb69b0a6e_0_202:notes"/>
+          <p:cNvPr id="242" name="Google Shape;242;g29fb69b0a6e_0_202:notes"/>
           <p:cNvSpPr/>
           <p:nvPr>
             <p:ph idx="2" type="sldImg"/>
@@ -2342,7 +2342,7 @@
       </p:sp>
       <p:sp>
         <p:nvSpPr>
-          <p:cNvPr id="231" name="Google Shape;231;g29fb69b0a6e_0_202:notes"/>
+          <p:cNvPr id="243" name="Google Shape;243;g29fb69b0a6e_0_202:notes"/>
           <p:cNvSpPr txBox="1"/>
           <p:nvPr>
             <p:ph idx="1" type="body"/>
@@ -2392,7 +2392,7 @@
   <p:cSld>
     <p:spTree>
       <p:nvGrpSpPr>
-        <p:cNvPr id="237" name="Shape 237"/>
+        <p:cNvPr id="249" name="Shape 249"/>
         <p:cNvGrpSpPr/>
         <p:nvPr/>
       </p:nvGrpSpPr>
@@ -2406,7 +2406,7 @@
       </p:grpSpPr>
       <p:sp>
         <p:nvSpPr>
-          <p:cNvPr id="238" name="Google Shape;238;g29fb69b0a6e_0_228:notes"/>
+          <p:cNvPr id="250" name="Google Shape;250;g29fb69b0a6e_0_228:notes"/>
           <p:cNvSpPr/>
           <p:nvPr>
             <p:ph idx="2" type="sldImg"/>
@@ -2441,7 +2441,7 @@
       </p:sp>
       <p:sp>
         <p:nvSpPr>
-          <p:cNvPr id="239" name="Google Shape;239;g29fb69b0a6e_0_228:notes"/>
+          <p:cNvPr id="251" name="Google Shape;251;g29fb69b0a6e_0_228:notes"/>
           <p:cNvSpPr txBox="1"/>
           <p:nvPr>
             <p:ph idx="1" type="body"/>
@@ -2491,7 +2491,7 @@
   <p:cSld>
     <p:spTree>
       <p:nvGrpSpPr>
-        <p:cNvPr id="246" name="Shape 246"/>
+        <p:cNvPr id="258" name="Shape 258"/>
         <p:cNvGrpSpPr/>
         <p:nvPr/>
       </p:nvGrpSpPr>
@@ -2505,7 +2505,7 @@
       </p:grpSpPr>
       <p:sp>
         <p:nvSpPr>
-          <p:cNvPr id="247" name="Google Shape;247;g2a55ac4951d_0_0:notes"/>
+          <p:cNvPr id="259" name="Google Shape;259;g2a55ac4951d_0_0:notes"/>
           <p:cNvSpPr/>
           <p:nvPr>
             <p:ph idx="2" type="sldImg"/>
@@ -2540,7 +2540,7 @@
       </p:sp>
       <p:sp>
         <p:nvSpPr>
-          <p:cNvPr id="248" name="Google Shape;248;g2a55ac4951d_0_0:notes"/>
+          <p:cNvPr id="260" name="Google Shape;260;g2a55ac4951d_0_0:notes"/>
           <p:cNvSpPr txBox="1"/>
           <p:nvPr>
             <p:ph idx="1" type="body"/>
@@ -8300,7 +8300,7 @@
   <p:cSld>
     <p:spTree>
       <p:nvGrpSpPr>
-        <p:cNvPr id="126" name="Shape 126"/>
+        <p:cNvPr id="130" name="Shape 130"/>
         <p:cNvGrpSpPr/>
         <p:nvPr/>
       </p:nvGrpSpPr>
@@ -8314,7 +8314,7 @@
       </p:grpSpPr>
       <p:sp>
         <p:nvSpPr>
-          <p:cNvPr id="127" name="Google Shape;127;p22"/>
+          <p:cNvPr id="131" name="Google Shape;131;p22"/>
           <p:cNvSpPr txBox="1"/>
           <p:nvPr>
             <p:ph type="title"/>
@@ -8364,7 +8364,7 @@
       </p:sp>
       <p:sp>
         <p:nvSpPr>
-          <p:cNvPr id="128" name="Google Shape;128;p22"/>
+          <p:cNvPr id="132" name="Google Shape;132;p22"/>
           <p:cNvSpPr txBox="1"/>
           <p:nvPr>
             <p:ph idx="12" type="sldNum"/>
@@ -8415,7 +8415,7 @@
   <p:cSld>
     <p:spTree>
       <p:nvGrpSpPr>
-        <p:cNvPr id="132" name="Shape 132"/>
+        <p:cNvPr id="136" name="Shape 136"/>
         <p:cNvGrpSpPr/>
         <p:nvPr/>
       </p:nvGrpSpPr>
@@ -8429,7 +8429,7 @@
       </p:grpSpPr>
       <p:sp>
         <p:nvSpPr>
-          <p:cNvPr id="133" name="Google Shape;133;p23"/>
+          <p:cNvPr id="137" name="Google Shape;137;p23"/>
           <p:cNvSpPr txBox="1"/>
           <p:nvPr>
             <p:ph type="title"/>
@@ -8479,7 +8479,7 @@
       </p:sp>
       <p:sp>
         <p:nvSpPr>
-          <p:cNvPr id="134" name="Google Shape;134;p23"/>
+          <p:cNvPr id="138" name="Google Shape;138;p23"/>
           <p:cNvSpPr txBox="1"/>
           <p:nvPr>
             <p:ph idx="1" type="body"/>
@@ -8679,7 +8679,7 @@
       </p:sp>
       <p:sp>
         <p:nvSpPr>
-          <p:cNvPr id="135" name="Google Shape;135;p23"/>
+          <p:cNvPr id="139" name="Google Shape;139;p23"/>
           <p:cNvSpPr txBox="1"/>
           <p:nvPr>
             <p:ph idx="12" type="sldNum"/>
@@ -8719,7 +8719,7 @@
       </p:sp>
       <p:pic>
         <p:nvPicPr>
-          <p:cNvPr id="136" name="Google Shape;136;p23"/>
+          <p:cNvPr id="140" name="Google Shape;140;p23"/>
           <p:cNvPicPr preferRelativeResize="0"/>
           <p:nvPr/>
         </p:nvPicPr>
@@ -8747,7 +8747,7 @@
       </p:pic>
       <p:pic>
         <p:nvPicPr>
-          <p:cNvPr id="137" name="Google Shape;137;p23"/>
+          <p:cNvPr id="141" name="Google Shape;141;p23"/>
           <p:cNvPicPr preferRelativeResize="0"/>
           <p:nvPr/>
         </p:nvPicPr>
@@ -8775,7 +8775,7 @@
       </p:pic>
       <p:pic>
         <p:nvPicPr>
-          <p:cNvPr id="138" name="Google Shape;138;p23"/>
+          <p:cNvPr id="142" name="Google Shape;142;p23"/>
           <p:cNvPicPr preferRelativeResize="0"/>
           <p:nvPr/>
         </p:nvPicPr>
@@ -8803,7 +8803,7 @@
       </p:pic>
       <p:pic>
         <p:nvPicPr>
-          <p:cNvPr id="139" name="Google Shape;139;p23"/>
+          <p:cNvPr id="143" name="Google Shape;143;p23"/>
           <p:cNvPicPr preferRelativeResize="0"/>
           <p:nvPr/>
         </p:nvPicPr>
@@ -8831,7 +8831,7 @@
       </p:pic>
       <p:pic>
         <p:nvPicPr>
-          <p:cNvPr id="140" name="Google Shape;140;p23"/>
+          <p:cNvPr id="144" name="Google Shape;144;p23"/>
           <p:cNvPicPr preferRelativeResize="0"/>
           <p:nvPr/>
         </p:nvPicPr>
@@ -8859,7 +8859,7 @@
       </p:pic>
       <p:pic>
         <p:nvPicPr>
-          <p:cNvPr id="141" name="Google Shape;141;p23"/>
+          <p:cNvPr id="145" name="Google Shape;145;p23"/>
           <p:cNvPicPr preferRelativeResize="0"/>
           <p:nvPr/>
         </p:nvPicPr>
@@ -8898,7 +8898,7 @@
   <p:cSld>
     <p:spTree>
       <p:nvGrpSpPr>
-        <p:cNvPr id="145" name="Shape 145"/>
+        <p:cNvPr id="149" name="Shape 149"/>
         <p:cNvGrpSpPr/>
         <p:nvPr/>
       </p:nvGrpSpPr>
@@ -8912,7 +8912,7 @@
       </p:grpSpPr>
       <p:sp>
         <p:nvSpPr>
-          <p:cNvPr id="146" name="Google Shape;146;p24"/>
+          <p:cNvPr id="150" name="Google Shape;150;p24"/>
           <p:cNvSpPr txBox="1"/>
           <p:nvPr>
             <p:ph idx="12" type="sldNum"/>
@@ -8952,7 +8952,7 @@
       </p:sp>
       <p:pic>
         <p:nvPicPr>
-          <p:cNvPr id="147" name="Google Shape;147;p24"/>
+          <p:cNvPr id="151" name="Google Shape;151;p24"/>
           <p:cNvPicPr preferRelativeResize="0"/>
           <p:nvPr/>
         </p:nvPicPr>
@@ -8980,7 +8980,7 @@
       </p:pic>
       <p:pic>
         <p:nvPicPr>
-          <p:cNvPr id="148" name="Google Shape;148;p24"/>
+          <p:cNvPr id="152" name="Google Shape;152;p24"/>
           <p:cNvPicPr preferRelativeResize="0"/>
           <p:nvPr/>
         </p:nvPicPr>
@@ -9008,7 +9008,7 @@
       </p:pic>
       <p:pic>
         <p:nvPicPr>
-          <p:cNvPr id="149" name="Google Shape;149;p24"/>
+          <p:cNvPr id="153" name="Google Shape;153;p24"/>
           <p:cNvPicPr preferRelativeResize="0"/>
           <p:nvPr/>
         </p:nvPicPr>
@@ -9036,7 +9036,7 @@
       </p:pic>
       <p:pic>
         <p:nvPicPr>
-          <p:cNvPr id="150" name="Google Shape;150;p24"/>
+          <p:cNvPr id="154" name="Google Shape;154;p24"/>
           <p:cNvPicPr preferRelativeResize="0"/>
           <p:nvPr/>
         </p:nvPicPr>
@@ -9075,7 +9075,7 @@
   <p:cSld>
     <p:spTree>
       <p:nvGrpSpPr>
-        <p:cNvPr id="154" name="Shape 154"/>
+        <p:cNvPr id="158" name="Shape 158"/>
         <p:cNvGrpSpPr/>
         <p:nvPr/>
       </p:nvGrpSpPr>
@@ -9089,7 +9089,7 @@
       </p:grpSpPr>
       <p:sp>
         <p:nvSpPr>
-          <p:cNvPr id="155" name="Google Shape;155;p25"/>
+          <p:cNvPr id="159" name="Google Shape;159;p25"/>
           <p:cNvSpPr txBox="1"/>
           <p:nvPr>
             <p:ph type="title"/>
@@ -9139,7 +9139,7 @@
       </p:sp>
       <p:sp>
         <p:nvSpPr>
-          <p:cNvPr id="156" name="Google Shape;156;p25"/>
+          <p:cNvPr id="160" name="Google Shape;160;p25"/>
           <p:cNvSpPr txBox="1"/>
           <p:nvPr>
             <p:ph idx="12" type="sldNum"/>
@@ -9190,7 +9190,7 @@
   <p:cSld>
     <p:spTree>
       <p:nvGrpSpPr>
-        <p:cNvPr id="160" name="Shape 160"/>
+        <p:cNvPr id="164" name="Shape 164"/>
         <p:cNvGrpSpPr/>
         <p:nvPr/>
       </p:nvGrpSpPr>
@@ -9204,7 +9204,7 @@
       </p:grpSpPr>
       <p:sp>
         <p:nvSpPr>
-          <p:cNvPr id="161" name="Google Shape;161;p26"/>
+          <p:cNvPr id="165" name="Google Shape;165;p26"/>
           <p:cNvSpPr txBox="1"/>
           <p:nvPr>
             <p:ph type="title"/>
@@ -9254,7 +9254,7 @@
       </p:sp>
       <p:sp>
         <p:nvSpPr>
-          <p:cNvPr id="162" name="Google Shape;162;p26"/>
+          <p:cNvPr id="166" name="Google Shape;166;p26"/>
           <p:cNvSpPr txBox="1"/>
           <p:nvPr>
             <p:ph idx="1" type="body"/>
@@ -9671,7 +9671,7 @@
       </p:sp>
       <p:sp>
         <p:nvSpPr>
-          <p:cNvPr id="163" name="Google Shape;163;p26"/>
+          <p:cNvPr id="167" name="Google Shape;167;p26"/>
           <p:cNvSpPr txBox="1"/>
           <p:nvPr>
             <p:ph idx="12" type="sldNum"/>
@@ -9711,7 +9711,7 @@
       </p:sp>
       <p:pic>
         <p:nvPicPr>
-          <p:cNvPr id="164" name="Google Shape;164;p26"/>
+          <p:cNvPr id="168" name="Google Shape;168;p26"/>
           <p:cNvPicPr preferRelativeResize="0"/>
           <p:nvPr/>
         </p:nvPicPr>
@@ -9739,7 +9739,7 @@
       </p:pic>
       <p:pic>
         <p:nvPicPr>
-          <p:cNvPr id="165" name="Google Shape;165;p26"/>
+          <p:cNvPr id="169" name="Google Shape;169;p26"/>
           <p:cNvPicPr preferRelativeResize="0"/>
           <p:nvPr/>
         </p:nvPicPr>
@@ -9778,7 +9778,7 @@
   <p:cSld>
     <p:spTree>
       <p:nvGrpSpPr>
-        <p:cNvPr id="169" name="Shape 169"/>
+        <p:cNvPr id="173" name="Shape 173"/>
         <p:cNvGrpSpPr/>
         <p:nvPr/>
       </p:nvGrpSpPr>
@@ -9792,7 +9792,7 @@
       </p:grpSpPr>
       <p:sp>
         <p:nvSpPr>
-          <p:cNvPr id="170" name="Google Shape;170;p27"/>
+          <p:cNvPr id="174" name="Google Shape;174;p27"/>
           <p:cNvSpPr txBox="1"/>
           <p:nvPr>
             <p:ph type="title"/>
@@ -9851,7 +9851,7 @@
       </p:sp>
       <p:sp>
         <p:nvSpPr>
-          <p:cNvPr id="171" name="Google Shape;171;p27"/>
+          <p:cNvPr id="175" name="Google Shape;175;p27"/>
           <p:cNvSpPr txBox="1"/>
           <p:nvPr>
             <p:ph idx="1" type="body"/>
@@ -10148,7 +10148,7 @@
       </p:sp>
       <p:sp>
         <p:nvSpPr>
-          <p:cNvPr id="172" name="Google Shape;172;p27"/>
+          <p:cNvPr id="176" name="Google Shape;176;p27"/>
           <p:cNvSpPr txBox="1"/>
           <p:nvPr>
             <p:ph idx="12" type="sldNum"/>
@@ -10188,7 +10188,7 @@
       </p:sp>
       <p:pic>
         <p:nvPicPr>
-          <p:cNvPr id="173" name="Google Shape;173;p27"/>
+          <p:cNvPr id="177" name="Google Shape;177;p27"/>
           <p:cNvPicPr preferRelativeResize="0"/>
           <p:nvPr/>
         </p:nvPicPr>
@@ -10227,7 +10227,7 @@
   <p:cSld>
     <p:spTree>
       <p:nvGrpSpPr>
-        <p:cNvPr id="177" name="Shape 177"/>
+        <p:cNvPr id="181" name="Shape 181"/>
         <p:cNvGrpSpPr/>
         <p:nvPr/>
       </p:nvGrpSpPr>
@@ -10241,7 +10241,7 @@
       </p:grpSpPr>
       <p:sp>
         <p:nvSpPr>
-          <p:cNvPr id="178" name="Google Shape;178;p28"/>
+          <p:cNvPr id="182" name="Google Shape;182;p28"/>
           <p:cNvSpPr txBox="1"/>
           <p:nvPr>
             <p:ph type="title"/>
@@ -10291,7 +10291,7 @@
       </p:sp>
       <p:sp>
         <p:nvSpPr>
-          <p:cNvPr id="179" name="Google Shape;179;p28"/>
+          <p:cNvPr id="183" name="Google Shape;183;p28"/>
           <p:cNvSpPr txBox="1"/>
           <p:nvPr>
             <p:ph idx="1" type="body"/>
@@ -10378,7 +10378,7 @@
       </p:sp>
       <p:sp>
         <p:nvSpPr>
-          <p:cNvPr id="180" name="Google Shape;180;p28"/>
+          <p:cNvPr id="184" name="Google Shape;184;p28"/>
           <p:cNvSpPr txBox="1"/>
           <p:nvPr>
             <p:ph idx="12" type="sldNum"/>
@@ -10418,7 +10418,7 @@
       </p:sp>
       <p:pic>
         <p:nvPicPr>
-          <p:cNvPr id="181" name="Google Shape;181;p28"/>
+          <p:cNvPr id="185" name="Google Shape;185;p28"/>
           <p:cNvPicPr preferRelativeResize="0"/>
           <p:nvPr/>
         </p:nvPicPr>
@@ -10444,6 +10444,218 @@
           </a:ln>
         </p:spPr>
       </p:pic>
+      <p:sp>
+        <p:nvSpPr>
+          <p:cNvPr id="186" name="Google Shape;186;p28"/>
+          <p:cNvSpPr/>
+          <p:nvPr/>
+        </p:nvSpPr>
+        <p:spPr>
+          <a:xfrm>
+            <a:off x="1078250" y="2171288"/>
+            <a:ext cx="641100" cy="3351300"/>
+          </a:xfrm>
+          <a:prstGeom prst="rect">
+            <a:avLst/>
+          </a:prstGeom>
+          <a:solidFill>
+            <a:schemeClr val="lt1"/>
+          </a:solidFill>
+          <a:ln cap="flat" cmpd="sng" w="9525">
+            <a:solidFill>
+              <a:schemeClr val="lt1"/>
+            </a:solidFill>
+            <a:prstDash val="solid"/>
+            <a:round/>
+            <a:headEnd len="sm" w="sm" type="none"/>
+            <a:tailEnd len="sm" w="sm" type="none"/>
+          </a:ln>
+        </p:spPr>
+        <p:txBody>
+          <a:bodyPr anchorCtr="0" anchor="ctr" bIns="91425" lIns="91425" spcFirstLastPara="1" rIns="91425" wrap="square" tIns="91425">
+            <a:noAutofit/>
+          </a:bodyPr>
+          <a:lstStyle/>
+          <a:p>
+            <a:pPr indent="0" lvl="0" marL="0" rtl="0" algn="ctr">
+              <a:spcBef>
+                <a:spcPts val="0"/>
+              </a:spcBef>
+              <a:spcAft>
+                <a:spcPts val="0"/>
+              </a:spcAft>
+              <a:buNone/>
+            </a:pPr>
+            <a:r>
+              <a:t/>
+            </a:r>
+            <a:endParaRPr>
+              <a:solidFill>
+                <a:schemeClr val="lt1"/>
+              </a:solidFill>
+            </a:endParaRPr>
+          </a:p>
+        </p:txBody>
+      </p:sp>
+      <p:sp>
+        <p:nvSpPr>
+          <p:cNvPr id="187" name="Google Shape;187;p28"/>
+          <p:cNvSpPr/>
+          <p:nvPr/>
+        </p:nvSpPr>
+        <p:spPr>
+          <a:xfrm rot="-5400000">
+            <a:off x="2979150" y="3887638"/>
+            <a:ext cx="641100" cy="3351300"/>
+          </a:xfrm>
+          <a:prstGeom prst="rect">
+            <a:avLst/>
+          </a:prstGeom>
+          <a:solidFill>
+            <a:schemeClr val="lt1"/>
+          </a:solidFill>
+          <a:ln cap="flat" cmpd="sng" w="9525">
+            <a:solidFill>
+              <a:schemeClr val="lt1"/>
+            </a:solidFill>
+            <a:prstDash val="solid"/>
+            <a:round/>
+            <a:headEnd len="sm" w="sm" type="none"/>
+            <a:tailEnd len="sm" w="sm" type="none"/>
+          </a:ln>
+        </p:spPr>
+        <p:txBody>
+          <a:bodyPr anchorCtr="0" anchor="ctr" bIns="91425" lIns="91425" spcFirstLastPara="1" rIns="91425" wrap="square" tIns="91425">
+            <a:noAutofit/>
+          </a:bodyPr>
+          <a:lstStyle/>
+          <a:p>
+            <a:pPr indent="0" lvl="0" marL="0" rtl="0" algn="ctr">
+              <a:spcBef>
+                <a:spcPts val="0"/>
+              </a:spcBef>
+              <a:spcAft>
+                <a:spcPts val="0"/>
+              </a:spcAft>
+              <a:buNone/>
+            </a:pPr>
+            <a:r>
+              <a:t/>
+            </a:r>
+            <a:endParaRPr>
+              <a:solidFill>
+                <a:schemeClr val="lt1"/>
+              </a:solidFill>
+            </a:endParaRPr>
+          </a:p>
+        </p:txBody>
+      </p:sp>
+      <p:sp>
+        <p:nvSpPr>
+          <p:cNvPr id="188" name="Google Shape;188;p28"/>
+          <p:cNvSpPr/>
+          <p:nvPr/>
+        </p:nvSpPr>
+        <p:spPr>
+          <a:xfrm>
+            <a:off x="4572000" y="2298250"/>
+            <a:ext cx="502500" cy="3351300"/>
+          </a:xfrm>
+          <a:prstGeom prst="rect">
+            <a:avLst/>
+          </a:prstGeom>
+          <a:solidFill>
+            <a:schemeClr val="lt1"/>
+          </a:solidFill>
+          <a:ln cap="flat" cmpd="sng" w="9525">
+            <a:solidFill>
+              <a:schemeClr val="lt1"/>
+            </a:solidFill>
+            <a:prstDash val="solid"/>
+            <a:round/>
+            <a:headEnd len="sm" w="sm" type="none"/>
+            <a:tailEnd len="sm" w="sm" type="none"/>
+          </a:ln>
+        </p:spPr>
+        <p:txBody>
+          <a:bodyPr anchorCtr="0" anchor="ctr" bIns="91425" lIns="91425" spcFirstLastPara="1" rIns="91425" wrap="square" tIns="91425">
+            <a:noAutofit/>
+          </a:bodyPr>
+          <a:lstStyle/>
+          <a:p>
+            <a:pPr indent="0" lvl="0" marL="0" rtl="0" algn="ctr">
+              <a:spcBef>
+                <a:spcPts val="0"/>
+              </a:spcBef>
+              <a:spcAft>
+                <a:spcPts val="0"/>
+              </a:spcAft>
+              <a:buNone/>
+            </a:pPr>
+            <a:r>
+              <a:t/>
+            </a:r>
+            <a:endParaRPr>
+              <a:solidFill>
+                <a:schemeClr val="lt1"/>
+              </a:solidFill>
+            </a:endParaRPr>
+          </a:p>
+        </p:txBody>
+      </p:sp>
+      <p:sp>
+        <p:nvSpPr>
+          <p:cNvPr id="189" name="Google Shape;189;p28"/>
+          <p:cNvSpPr/>
+          <p:nvPr/>
+        </p:nvSpPr>
+        <p:spPr>
+          <a:xfrm rot="-5400000">
+            <a:off x="6399750" y="3818350"/>
+            <a:ext cx="502500" cy="3351300"/>
+          </a:xfrm>
+          <a:prstGeom prst="rect">
+            <a:avLst/>
+          </a:prstGeom>
+          <a:solidFill>
+            <a:schemeClr val="lt1"/>
+          </a:solidFill>
+          <a:ln cap="flat" cmpd="sng" w="9525">
+            <a:solidFill>
+              <a:schemeClr val="lt1"/>
+            </a:solidFill>
+            <a:prstDash val="solid"/>
+            <a:round/>
+            <a:headEnd len="sm" w="sm" type="none"/>
+            <a:tailEnd len="sm" w="sm" type="none"/>
+          </a:ln>
+        </p:spPr>
+        <p:txBody>
+          <a:bodyPr anchorCtr="0" anchor="ctr" bIns="91425" lIns="91425" spcFirstLastPara="1" rIns="91425" wrap="square" tIns="91425">
+            <a:noAutofit/>
+          </a:bodyPr>
+          <a:lstStyle/>
+          <a:p>
+            <a:pPr indent="0" lvl="0" marL="0" rtl="0" algn="ctr">
+              <a:spcBef>
+                <a:spcPts val="0"/>
+              </a:spcBef>
+              <a:spcAft>
+                <a:spcPts val="0"/>
+              </a:spcAft>
+              <a:buNone/>
+            </a:pPr>
+            <a:r>
+              <a:t/>
+            </a:r>
+            <a:endParaRPr>
+              <a:solidFill>
+                <a:schemeClr val="lt1"/>
+              </a:solidFill>
+            </a:endParaRPr>
+          </a:p>
+        </p:txBody>
+      </p:sp>
     </p:spTree>
   </p:cSld>
   <p:clrMapOvr>
@@ -10457,7 +10669,7 @@
   <p:cSld>
     <p:spTree>
       <p:nvGrpSpPr>
-        <p:cNvPr id="185" name="Shape 185"/>
+        <p:cNvPr id="193" name="Shape 193"/>
         <p:cNvGrpSpPr/>
         <p:nvPr/>
       </p:nvGrpSpPr>
@@ -10471,7 +10683,7 @@
       </p:grpSpPr>
       <p:sp>
         <p:nvSpPr>
-          <p:cNvPr id="186" name="Google Shape;186;p29"/>
+          <p:cNvPr id="194" name="Google Shape;194;p29"/>
           <p:cNvSpPr txBox="1"/>
           <p:nvPr>
             <p:ph idx="12" type="sldNum"/>
@@ -10511,7 +10723,7 @@
       </p:sp>
       <p:pic>
         <p:nvPicPr>
-          <p:cNvPr id="187" name="Google Shape;187;p29"/>
+          <p:cNvPr id="195" name="Google Shape;195;p29"/>
           <p:cNvPicPr preferRelativeResize="0"/>
           <p:nvPr/>
         </p:nvPicPr>
@@ -10539,7 +10751,7 @@
       </p:pic>
       <p:sp>
         <p:nvSpPr>
-          <p:cNvPr id="188" name="Google Shape;188;p29"/>
+          <p:cNvPr id="196" name="Google Shape;196;p29"/>
           <p:cNvSpPr txBox="1"/>
           <p:nvPr/>
         </p:nvSpPr>
@@ -10656,7 +10868,7 @@
   <p:cSld>
     <p:spTree>
       <p:nvGrpSpPr>
-        <p:cNvPr id="192" name="Shape 192"/>
+        <p:cNvPr id="200" name="Shape 200"/>
         <p:cNvGrpSpPr/>
         <p:nvPr/>
       </p:nvGrpSpPr>
@@ -10670,7 +10882,7 @@
       </p:grpSpPr>
       <p:sp>
         <p:nvSpPr>
-          <p:cNvPr id="193" name="Google Shape;193;p30"/>
+          <p:cNvPr id="201" name="Google Shape;201;p30"/>
           <p:cNvSpPr txBox="1"/>
           <p:nvPr>
             <p:ph type="title"/>
@@ -10720,7 +10932,7 @@
       </p:sp>
       <p:sp>
         <p:nvSpPr>
-          <p:cNvPr id="194" name="Google Shape;194;p30"/>
+          <p:cNvPr id="202" name="Google Shape;202;p30"/>
           <p:cNvSpPr txBox="1"/>
           <p:nvPr>
             <p:ph idx="1" type="body"/>
@@ -10937,7 +11149,7 @@
       </p:sp>
       <p:sp>
         <p:nvSpPr>
-          <p:cNvPr id="195" name="Google Shape;195;p30"/>
+          <p:cNvPr id="203" name="Google Shape;203;p30"/>
           <p:cNvSpPr txBox="1"/>
           <p:nvPr>
             <p:ph idx="12" type="sldNum"/>
@@ -10977,7 +11189,7 @@
       </p:sp>
       <p:pic>
         <p:nvPicPr>
-          <p:cNvPr id="196" name="Google Shape;196;p30"/>
+          <p:cNvPr id="204" name="Google Shape;204;p30"/>
           <p:cNvPicPr preferRelativeResize="0"/>
           <p:nvPr/>
         </p:nvPicPr>
@@ -11005,7 +11217,7 @@
       </p:pic>
       <p:pic>
         <p:nvPicPr>
-          <p:cNvPr id="197" name="Google Shape;197;p30"/>
+          <p:cNvPr id="205" name="Google Shape;205;p30"/>
           <p:cNvPicPr preferRelativeResize="0"/>
           <p:nvPr/>
         </p:nvPicPr>
@@ -11044,7 +11256,7 @@
   <p:cSld>
     <p:spTree>
       <p:nvGrpSpPr>
-        <p:cNvPr id="201" name="Shape 201"/>
+        <p:cNvPr id="209" name="Shape 209"/>
         <p:cNvGrpSpPr/>
         <p:nvPr/>
       </p:nvGrpSpPr>
@@ -11058,7 +11270,7 @@
       </p:grpSpPr>
       <p:sp>
         <p:nvSpPr>
-          <p:cNvPr id="202" name="Google Shape;202;p31"/>
+          <p:cNvPr id="210" name="Google Shape;210;p31"/>
           <p:cNvSpPr txBox="1"/>
           <p:nvPr>
             <p:ph type="title"/>
@@ -11108,7 +11320,7 @@
       </p:sp>
       <p:sp>
         <p:nvSpPr>
-          <p:cNvPr id="203" name="Google Shape;203;p31"/>
+          <p:cNvPr id="211" name="Google Shape;211;p31"/>
           <p:cNvSpPr txBox="1"/>
           <p:nvPr>
             <p:ph idx="1" type="body"/>
@@ -11195,7 +11407,7 @@
       </p:sp>
       <p:sp>
         <p:nvSpPr>
-          <p:cNvPr id="204" name="Google Shape;204;p31"/>
+          <p:cNvPr id="212" name="Google Shape;212;p31"/>
           <p:cNvSpPr txBox="1"/>
           <p:nvPr>
             <p:ph idx="12" type="sldNum"/>
@@ -11235,7 +11447,7 @@
       </p:sp>
       <p:pic>
         <p:nvPicPr>
-          <p:cNvPr id="205" name="Google Shape;205;p31"/>
+          <p:cNvPr id="213" name="Google Shape;213;p31"/>
           <p:cNvPicPr preferRelativeResize="0"/>
           <p:nvPr/>
         </p:nvPicPr>
@@ -11263,7 +11475,7 @@
       </p:pic>
       <p:sp>
         <p:nvSpPr>
-          <p:cNvPr id="206" name="Google Shape;206;p31"/>
+          <p:cNvPr id="214" name="Google Shape;214;p31"/>
           <p:cNvSpPr txBox="1"/>
           <p:nvPr/>
         </p:nvSpPr>
@@ -11677,274 +11889,6 @@
   <p:cSld>
     <p:spTree>
       <p:nvGrpSpPr>
-        <p:cNvPr id="210" name="Shape 210"/>
-        <p:cNvGrpSpPr/>
-        <p:nvPr/>
-      </p:nvGrpSpPr>
-      <p:grpSpPr>
-        <a:xfrm>
-          <a:off x="0" y="0"/>
-          <a:ext cx="0" cy="0"/>
-          <a:chOff x="0" y="0"/>
-          <a:chExt cx="0" cy="0"/>
-        </a:xfrm>
-      </p:grpSpPr>
-      <p:sp>
-        <p:nvSpPr>
-          <p:cNvPr id="211" name="Google Shape;211;p32"/>
-          <p:cNvSpPr txBox="1"/>
-          <p:nvPr>
-            <p:ph type="title"/>
-          </p:nvPr>
-        </p:nvSpPr>
-        <p:spPr>
-          <a:xfrm>
-            <a:off x="311700" y="593367"/>
-            <a:ext cx="8520600" cy="763500"/>
-          </a:xfrm>
-          <a:prstGeom prst="rect">
-            <a:avLst/>
-          </a:prstGeom>
-        </p:spPr>
-        <p:txBody>
-          <a:bodyPr anchorCtr="0" anchor="t" bIns="91425" lIns="91425" spcFirstLastPara="1" rIns="91425" wrap="square" tIns="91425">
-            <a:normAutofit/>
-          </a:bodyPr>
-          <a:lstStyle/>
-          <a:p>
-            <a:pPr indent="0" lvl="0" marL="0" rtl="0" algn="l">
-              <a:spcBef>
-                <a:spcPts val="0"/>
-              </a:spcBef>
-              <a:spcAft>
-                <a:spcPts val="0"/>
-              </a:spcAft>
-              <a:buNone/>
-            </a:pPr>
-            <a:r>
-              <a:rPr lang="en">
-                <a:latin typeface="Playfair Display"/>
-                <a:ea typeface="Playfair Display"/>
-                <a:cs typeface="Playfair Display"/>
-                <a:sym typeface="Playfair Display"/>
-              </a:rPr>
-              <a:t>Testing Trained Model on OOD Attack</a:t>
-            </a:r>
-            <a:endParaRPr>
-              <a:latin typeface="Playfair Display"/>
-              <a:ea typeface="Playfair Display"/>
-              <a:cs typeface="Playfair Display"/>
-              <a:sym typeface="Playfair Display"/>
-            </a:endParaRPr>
-          </a:p>
-        </p:txBody>
-      </p:sp>
-      <p:sp>
-        <p:nvSpPr>
-          <p:cNvPr id="212" name="Google Shape;212;p32"/>
-          <p:cNvSpPr txBox="1"/>
-          <p:nvPr>
-            <p:ph idx="1" type="body"/>
-          </p:nvPr>
-        </p:nvSpPr>
-        <p:spPr>
-          <a:xfrm>
-            <a:off x="311700" y="1536624"/>
-            <a:ext cx="8520600" cy="5077800"/>
-          </a:xfrm>
-          <a:prstGeom prst="rect">
-            <a:avLst/>
-          </a:prstGeom>
-        </p:spPr>
-        <p:txBody>
-          <a:bodyPr anchorCtr="0" anchor="t" bIns="91425" lIns="91425" spcFirstLastPara="1" rIns="91425" wrap="square" tIns="91425">
-            <a:normAutofit/>
-          </a:bodyPr>
-          <a:lstStyle/>
-          <a:p>
-            <a:pPr indent="0" lvl="0" marL="0" rtl="0" algn="l">
-              <a:spcBef>
-                <a:spcPts val="0"/>
-              </a:spcBef>
-              <a:spcAft>
-                <a:spcPts val="0"/>
-              </a:spcAft>
-              <a:buNone/>
-            </a:pPr>
-            <a:r>
-              <a:rPr lang="en" sz="2000">
-                <a:latin typeface="Roboto"/>
-                <a:ea typeface="Roboto"/>
-                <a:cs typeface="Roboto"/>
-                <a:sym typeface="Roboto"/>
-              </a:rPr>
-              <a:t>Generating new OOD Attack using FGSM but with </a:t>
-            </a:r>
-            <a:r>
-              <a:rPr lang="en" sz="2000">
-                <a:solidFill>
-                  <a:schemeClr val="accent1"/>
-                </a:solidFill>
-                <a:latin typeface="Roboto"/>
-                <a:ea typeface="Roboto"/>
-                <a:cs typeface="Roboto"/>
-                <a:sym typeface="Roboto"/>
-              </a:rPr>
-              <a:t>ε = </a:t>
-            </a:r>
-            <a:r>
-              <a:rPr b="1" lang="en" sz="2000">
-                <a:solidFill>
-                  <a:schemeClr val="accent1"/>
-                </a:solidFill>
-                <a:latin typeface="Roboto"/>
-                <a:ea typeface="Roboto"/>
-                <a:cs typeface="Roboto"/>
-                <a:sym typeface="Roboto"/>
-              </a:rPr>
-              <a:t>0.6</a:t>
-            </a:r>
-            <a:endParaRPr b="1" sz="2000">
-              <a:latin typeface="Roboto"/>
-              <a:ea typeface="Roboto"/>
-              <a:cs typeface="Roboto"/>
-              <a:sym typeface="Roboto"/>
-            </a:endParaRPr>
-          </a:p>
-          <a:p>
-            <a:pPr indent="-355600" lvl="0" marL="457200" rtl="0" algn="l">
-              <a:spcBef>
-                <a:spcPts val="1200"/>
-              </a:spcBef>
-              <a:spcAft>
-                <a:spcPts val="0"/>
-              </a:spcAft>
-              <a:buSzPts val="2000"/>
-              <a:buFont typeface="Roboto"/>
-              <a:buChar char="-"/>
-            </a:pPr>
-            <a:r>
-              <a:rPr lang="en" sz="2000">
-                <a:latin typeface="Roboto"/>
-                <a:ea typeface="Roboto"/>
-                <a:cs typeface="Roboto"/>
-                <a:sym typeface="Roboto"/>
-              </a:rPr>
-              <a:t>Perturbs the input images twice as much</a:t>
-            </a:r>
-            <a:endParaRPr sz="2000">
-              <a:latin typeface="Roboto"/>
-              <a:ea typeface="Roboto"/>
-              <a:cs typeface="Roboto"/>
-              <a:sym typeface="Roboto"/>
-            </a:endParaRPr>
-          </a:p>
-          <a:p>
-            <a:pPr indent="0" lvl="0" marL="0" rtl="0" algn="l">
-              <a:spcBef>
-                <a:spcPts val="1200"/>
-              </a:spcBef>
-              <a:spcAft>
-                <a:spcPts val="1200"/>
-              </a:spcAft>
-              <a:buNone/>
-            </a:pPr>
-            <a:r>
-              <a:t/>
-            </a:r>
-            <a:endParaRPr sz="2000">
-              <a:solidFill>
-                <a:schemeClr val="dk1"/>
-              </a:solidFill>
-              <a:latin typeface="Roboto"/>
-              <a:ea typeface="Roboto"/>
-              <a:cs typeface="Roboto"/>
-              <a:sym typeface="Roboto"/>
-            </a:endParaRPr>
-          </a:p>
-        </p:txBody>
-      </p:sp>
-      <p:sp>
-        <p:nvSpPr>
-          <p:cNvPr id="213" name="Google Shape;213;p32"/>
-          <p:cNvSpPr txBox="1"/>
-          <p:nvPr>
-            <p:ph idx="12" type="sldNum"/>
-          </p:nvPr>
-        </p:nvSpPr>
-        <p:spPr>
-          <a:xfrm>
-            <a:off x="8472458" y="6217622"/>
-            <a:ext cx="548700" cy="524700"/>
-          </a:xfrm>
-          <a:prstGeom prst="rect">
-            <a:avLst/>
-          </a:prstGeom>
-        </p:spPr>
-        <p:txBody>
-          <a:bodyPr anchorCtr="0" anchor="ctr" bIns="91425" lIns="91425" spcFirstLastPara="1" rIns="91425" wrap="square" tIns="91425">
-            <a:normAutofit/>
-          </a:bodyPr>
-          <a:lstStyle/>
-          <a:p>
-            <a:pPr indent="0" lvl="0" marL="0" rtl="0" algn="r">
-              <a:spcBef>
-                <a:spcPts val="0"/>
-              </a:spcBef>
-              <a:spcAft>
-                <a:spcPts val="0"/>
-              </a:spcAft>
-              <a:buNone/>
-            </a:pPr>
-            <a:fld id="{00000000-1234-1234-1234-123412341234}" type="slidenum">
-              <a:rPr lang="en"/>
-              <a:t>‹#›</a:t>
-            </a:fld>
-            <a:endParaRPr/>
-          </a:p>
-        </p:txBody>
-      </p:sp>
-      <p:pic>
-        <p:nvPicPr>
-          <p:cNvPr id="214" name="Google Shape;214;p32"/>
-          <p:cNvPicPr preferRelativeResize="0"/>
-          <p:nvPr/>
-        </p:nvPicPr>
-        <p:blipFill>
-          <a:blip r:embed="rId3">
-            <a:alphaModFix/>
-          </a:blip>
-          <a:stretch>
-            <a:fillRect/>
-          </a:stretch>
-        </p:blipFill>
-        <p:spPr>
-          <a:xfrm>
-            <a:off x="1373050" y="2792553"/>
-            <a:ext cx="6397888" cy="3372800"/>
-          </a:xfrm>
-          <a:prstGeom prst="rect">
-            <a:avLst/>
-          </a:prstGeom>
-          <a:noFill/>
-          <a:ln>
-            <a:noFill/>
-          </a:ln>
-        </p:spPr>
-      </p:pic>
-    </p:spTree>
-  </p:cSld>
-  <p:clrMapOvr>
-    <a:masterClrMapping/>
-  </p:clrMapOvr>
-</p:sld>
-</file>
-
-<file path=ppt/slides/slide21.xml><?xml version="1.0" encoding="utf-8"?>
-<p:sld xmlns:a="http://schemas.openxmlformats.org/drawingml/2006/main" xmlns:r="http://schemas.openxmlformats.org/officeDocument/2006/relationships" xmlns:mc="http://schemas.openxmlformats.org/markup-compatibility/2006" xmlns:mv="urn:schemas-microsoft-com:mac:vml" xmlns:p="http://schemas.openxmlformats.org/presentationml/2006/main" xmlns:c="http://schemas.openxmlformats.org/drawingml/2006/chart" xmlns:dgm="http://schemas.openxmlformats.org/drawingml/2006/diagram" xmlns:o="urn:schemas-microsoft-com:office:office" xmlns:v="urn:schemas-microsoft-com:vml" xmlns:pvml="urn:schemas-microsoft-com:office:powerpoint" xmlns:com="http://schemas.openxmlformats.org/drawingml/2006/compatibility" xmlns:p14="http://schemas.microsoft.com/office/powerpoint/2010/main" xmlns:p15="http://schemas.microsoft.com/office/powerpoint/2012/main" xmlns:ahyp="http://schemas.microsoft.com/office/drawing/2018/hyperlinkcolor">
-  <p:cSld>
-    <p:spTree>
-      <p:nvGrpSpPr>
         <p:cNvPr id="218" name="Shape 218"/>
         <p:cNvGrpSpPr/>
         <p:nvPr/>
@@ -11959,7 +11903,182 @@
       </p:grpSpPr>
       <p:sp>
         <p:nvSpPr>
-          <p:cNvPr id="219" name="Google Shape;219;p33"/>
+          <p:cNvPr id="219" name="Google Shape;219;p32"/>
+          <p:cNvSpPr txBox="1"/>
+          <p:nvPr>
+            <p:ph type="title"/>
+          </p:nvPr>
+        </p:nvSpPr>
+        <p:spPr>
+          <a:xfrm>
+            <a:off x="311700" y="593367"/>
+            <a:ext cx="8520600" cy="763500"/>
+          </a:xfrm>
+          <a:prstGeom prst="rect">
+            <a:avLst/>
+          </a:prstGeom>
+        </p:spPr>
+        <p:txBody>
+          <a:bodyPr anchorCtr="0" anchor="t" bIns="91425" lIns="91425" spcFirstLastPara="1" rIns="91425" wrap="square" tIns="91425">
+            <a:normAutofit/>
+          </a:bodyPr>
+          <a:lstStyle/>
+          <a:p>
+            <a:pPr indent="0" lvl="0" marL="0" rtl="0" algn="l">
+              <a:spcBef>
+                <a:spcPts val="0"/>
+              </a:spcBef>
+              <a:spcAft>
+                <a:spcPts val="0"/>
+              </a:spcAft>
+              <a:buNone/>
+            </a:pPr>
+            <a:r>
+              <a:rPr lang="en">
+                <a:latin typeface="Playfair Display"/>
+                <a:ea typeface="Playfair Display"/>
+                <a:cs typeface="Playfair Display"/>
+                <a:sym typeface="Playfair Display"/>
+              </a:rPr>
+              <a:t>Testing Trained Model on OOD Attack</a:t>
+            </a:r>
+            <a:endParaRPr>
+              <a:latin typeface="Playfair Display"/>
+              <a:ea typeface="Playfair Display"/>
+              <a:cs typeface="Playfair Display"/>
+              <a:sym typeface="Playfair Display"/>
+            </a:endParaRPr>
+          </a:p>
+        </p:txBody>
+      </p:sp>
+      <p:sp>
+        <p:nvSpPr>
+          <p:cNvPr id="220" name="Google Shape;220;p32"/>
+          <p:cNvSpPr txBox="1"/>
+          <p:nvPr>
+            <p:ph idx="1" type="body"/>
+          </p:nvPr>
+        </p:nvSpPr>
+        <p:spPr>
+          <a:xfrm>
+            <a:off x="311700" y="1536624"/>
+            <a:ext cx="8520600" cy="5077800"/>
+          </a:xfrm>
+          <a:prstGeom prst="rect">
+            <a:avLst/>
+          </a:prstGeom>
+        </p:spPr>
+        <p:txBody>
+          <a:bodyPr anchorCtr="0" anchor="t" bIns="91425" lIns="91425" spcFirstLastPara="1" rIns="91425" wrap="square" tIns="91425">
+            <a:normAutofit/>
+          </a:bodyPr>
+          <a:lstStyle/>
+          <a:p>
+            <a:pPr indent="0" lvl="0" marL="0" rtl="0" algn="l">
+              <a:spcBef>
+                <a:spcPts val="0"/>
+              </a:spcBef>
+              <a:spcAft>
+                <a:spcPts val="0"/>
+              </a:spcAft>
+              <a:buNone/>
+            </a:pPr>
+            <a:r>
+              <a:rPr lang="en" sz="2000">
+                <a:latin typeface="Roboto"/>
+                <a:ea typeface="Roboto"/>
+                <a:cs typeface="Roboto"/>
+                <a:sym typeface="Roboto"/>
+              </a:rPr>
+              <a:t>Generating new OOD Attack using FGSM but with </a:t>
+            </a:r>
+            <a:r>
+              <a:rPr lang="en" sz="2000">
+                <a:solidFill>
+                  <a:schemeClr val="accent1"/>
+                </a:solidFill>
+                <a:latin typeface="Roboto"/>
+                <a:ea typeface="Roboto"/>
+                <a:cs typeface="Roboto"/>
+                <a:sym typeface="Roboto"/>
+              </a:rPr>
+              <a:t>ε = </a:t>
+            </a:r>
+            <a:r>
+              <a:rPr b="1" lang="en" sz="2000">
+                <a:solidFill>
+                  <a:schemeClr val="accent1"/>
+                </a:solidFill>
+                <a:latin typeface="Roboto"/>
+                <a:ea typeface="Roboto"/>
+                <a:cs typeface="Roboto"/>
+                <a:sym typeface="Roboto"/>
+              </a:rPr>
+              <a:t>0.6</a:t>
+            </a:r>
+            <a:endParaRPr b="1" sz="2000">
+              <a:latin typeface="Roboto"/>
+              <a:ea typeface="Roboto"/>
+              <a:cs typeface="Roboto"/>
+              <a:sym typeface="Roboto"/>
+            </a:endParaRPr>
+          </a:p>
+          <a:p>
+            <a:pPr indent="-355600" lvl="0" marL="457200" rtl="0" algn="l">
+              <a:spcBef>
+                <a:spcPts val="1200"/>
+              </a:spcBef>
+              <a:spcAft>
+                <a:spcPts val="0"/>
+              </a:spcAft>
+              <a:buSzPts val="2000"/>
+              <a:buFont typeface="Roboto"/>
+              <a:buChar char="-"/>
+            </a:pPr>
+            <a:r>
+              <a:rPr lang="en" sz="2000">
+                <a:latin typeface="Roboto"/>
+                <a:ea typeface="Roboto"/>
+                <a:cs typeface="Roboto"/>
+                <a:sym typeface="Roboto"/>
+              </a:rPr>
+              <a:t>Perturbs the input images twice as much</a:t>
+            </a:r>
+            <a:endParaRPr sz="2000">
+              <a:latin typeface="Roboto"/>
+              <a:ea typeface="Roboto"/>
+              <a:cs typeface="Roboto"/>
+              <a:sym typeface="Roboto"/>
+            </a:endParaRPr>
+          </a:p>
+          <a:p>
+            <a:pPr indent="0" lvl="0" marL="0" rtl="0" algn="l">
+              <a:spcBef>
+                <a:spcPts val="1200"/>
+              </a:spcBef>
+              <a:spcAft>
+                <a:spcPts val="1200"/>
+              </a:spcAft>
+              <a:buNone/>
+            </a:pPr>
+            <a:r>
+              <a:t/>
+            </a:r>
+            <a:endParaRPr sz="2000">
+              <a:solidFill>
+                <a:schemeClr val="dk1"/>
+              </a:solidFill>
+              <a:latin typeface="Roboto"/>
+              <a:ea typeface="Roboto"/>
+              <a:cs typeface="Roboto"/>
+              <a:sym typeface="Roboto"/>
+            </a:endParaRPr>
+          </a:p>
+        </p:txBody>
+      </p:sp>
+      <p:sp>
+        <p:nvSpPr>
+          <p:cNvPr id="221" name="Google Shape;221;p32"/>
           <p:cNvSpPr txBox="1"/>
           <p:nvPr>
             <p:ph idx="12" type="sldNum"/>
@@ -11999,7 +12118,7 @@
       </p:sp>
       <p:pic>
         <p:nvPicPr>
-          <p:cNvPr id="220" name="Google Shape;220;p33"/>
+          <p:cNvPr id="222" name="Google Shape;222;p32"/>
           <p:cNvPicPr preferRelativeResize="0"/>
           <p:nvPr/>
         </p:nvPicPr>
@@ -12013,8 +12132,8 @@
         </p:blipFill>
         <p:spPr>
           <a:xfrm>
-            <a:off x="1614375" y="155424"/>
-            <a:ext cx="5915260" cy="6062201"/>
+            <a:off x="1373050" y="2792553"/>
+            <a:ext cx="6397888" cy="3372800"/>
           </a:xfrm>
           <a:prstGeom prst="rect">
             <a:avLst/>
@@ -12027,7 +12146,312 @@
       </p:pic>
       <p:sp>
         <p:nvSpPr>
-          <p:cNvPr id="221" name="Google Shape;221;p33"/>
+          <p:cNvPr id="223" name="Google Shape;223;p32"/>
+          <p:cNvSpPr/>
+          <p:nvPr/>
+        </p:nvSpPr>
+        <p:spPr>
+          <a:xfrm>
+            <a:off x="1262800" y="2803288"/>
+            <a:ext cx="641100" cy="3351300"/>
+          </a:xfrm>
+          <a:prstGeom prst="rect">
+            <a:avLst/>
+          </a:prstGeom>
+          <a:solidFill>
+            <a:schemeClr val="lt1"/>
+          </a:solidFill>
+          <a:ln cap="flat" cmpd="sng" w="9525">
+            <a:solidFill>
+              <a:schemeClr val="lt1"/>
+            </a:solidFill>
+            <a:prstDash val="solid"/>
+            <a:round/>
+            <a:headEnd len="sm" w="sm" type="none"/>
+            <a:tailEnd len="sm" w="sm" type="none"/>
+          </a:ln>
+        </p:spPr>
+        <p:txBody>
+          <a:bodyPr anchorCtr="0" anchor="ctr" bIns="91425" lIns="91425" spcFirstLastPara="1" rIns="91425" wrap="square" tIns="91425">
+            <a:noAutofit/>
+          </a:bodyPr>
+          <a:lstStyle/>
+          <a:p>
+            <a:pPr indent="0" lvl="0" marL="0" rtl="0" algn="ctr">
+              <a:spcBef>
+                <a:spcPts val="0"/>
+              </a:spcBef>
+              <a:spcAft>
+                <a:spcPts val="0"/>
+              </a:spcAft>
+              <a:buNone/>
+            </a:pPr>
+            <a:r>
+              <a:t/>
+            </a:r>
+            <a:endParaRPr>
+              <a:solidFill>
+                <a:schemeClr val="lt1"/>
+              </a:solidFill>
+            </a:endParaRPr>
+          </a:p>
+        </p:txBody>
+      </p:sp>
+      <p:sp>
+        <p:nvSpPr>
+          <p:cNvPr id="224" name="Google Shape;224;p32"/>
+          <p:cNvSpPr/>
+          <p:nvPr/>
+        </p:nvSpPr>
+        <p:spPr>
+          <a:xfrm rot="-5400000">
+            <a:off x="3037425" y="4432188"/>
+            <a:ext cx="641100" cy="3351300"/>
+          </a:xfrm>
+          <a:prstGeom prst="rect">
+            <a:avLst/>
+          </a:prstGeom>
+          <a:solidFill>
+            <a:schemeClr val="lt1"/>
+          </a:solidFill>
+          <a:ln cap="flat" cmpd="sng" w="9525">
+            <a:solidFill>
+              <a:schemeClr val="lt1"/>
+            </a:solidFill>
+            <a:prstDash val="solid"/>
+            <a:round/>
+            <a:headEnd len="sm" w="sm" type="none"/>
+            <a:tailEnd len="sm" w="sm" type="none"/>
+          </a:ln>
+        </p:spPr>
+        <p:txBody>
+          <a:bodyPr anchorCtr="0" anchor="ctr" bIns="91425" lIns="91425" spcFirstLastPara="1" rIns="91425" wrap="square" tIns="91425">
+            <a:noAutofit/>
+          </a:bodyPr>
+          <a:lstStyle/>
+          <a:p>
+            <a:pPr indent="0" lvl="0" marL="0" rtl="0" algn="ctr">
+              <a:spcBef>
+                <a:spcPts val="0"/>
+              </a:spcBef>
+              <a:spcAft>
+                <a:spcPts val="0"/>
+              </a:spcAft>
+              <a:buNone/>
+            </a:pPr>
+            <a:r>
+              <a:t/>
+            </a:r>
+            <a:endParaRPr>
+              <a:solidFill>
+                <a:schemeClr val="lt1"/>
+              </a:solidFill>
+            </a:endParaRPr>
+          </a:p>
+        </p:txBody>
+      </p:sp>
+      <p:sp>
+        <p:nvSpPr>
+          <p:cNvPr id="225" name="Google Shape;225;p32"/>
+          <p:cNvSpPr/>
+          <p:nvPr/>
+        </p:nvSpPr>
+        <p:spPr>
+          <a:xfrm>
+            <a:off x="4484925" y="3077100"/>
+            <a:ext cx="548700" cy="3351300"/>
+          </a:xfrm>
+          <a:prstGeom prst="rect">
+            <a:avLst/>
+          </a:prstGeom>
+          <a:solidFill>
+            <a:schemeClr val="lt1"/>
+          </a:solidFill>
+          <a:ln cap="flat" cmpd="sng" w="9525">
+            <a:solidFill>
+              <a:schemeClr val="lt1"/>
+            </a:solidFill>
+            <a:prstDash val="solid"/>
+            <a:round/>
+            <a:headEnd len="sm" w="sm" type="none"/>
+            <a:tailEnd len="sm" w="sm" type="none"/>
+          </a:ln>
+        </p:spPr>
+        <p:txBody>
+          <a:bodyPr anchorCtr="0" anchor="ctr" bIns="91425" lIns="91425" spcFirstLastPara="1" rIns="91425" wrap="square" tIns="91425">
+            <a:noAutofit/>
+          </a:bodyPr>
+          <a:lstStyle/>
+          <a:p>
+            <a:pPr indent="0" lvl="0" marL="0" rtl="0" algn="ctr">
+              <a:spcBef>
+                <a:spcPts val="0"/>
+              </a:spcBef>
+              <a:spcAft>
+                <a:spcPts val="0"/>
+              </a:spcAft>
+              <a:buNone/>
+            </a:pPr>
+            <a:r>
+              <a:t/>
+            </a:r>
+            <a:endParaRPr>
+              <a:solidFill>
+                <a:schemeClr val="lt1"/>
+              </a:solidFill>
+            </a:endParaRPr>
+          </a:p>
+        </p:txBody>
+      </p:sp>
+      <p:sp>
+        <p:nvSpPr>
+          <p:cNvPr id="226" name="Google Shape;226;p32"/>
+          <p:cNvSpPr/>
+          <p:nvPr/>
+        </p:nvSpPr>
+        <p:spPr>
+          <a:xfrm rot="-5400000">
+            <a:off x="6191525" y="4386000"/>
+            <a:ext cx="548700" cy="3351300"/>
+          </a:xfrm>
+          <a:prstGeom prst="rect">
+            <a:avLst/>
+          </a:prstGeom>
+          <a:solidFill>
+            <a:schemeClr val="lt1"/>
+          </a:solidFill>
+          <a:ln cap="flat" cmpd="sng" w="9525">
+            <a:solidFill>
+              <a:schemeClr val="lt1"/>
+            </a:solidFill>
+            <a:prstDash val="solid"/>
+            <a:round/>
+            <a:headEnd len="sm" w="sm" type="none"/>
+            <a:tailEnd len="sm" w="sm" type="none"/>
+          </a:ln>
+        </p:spPr>
+        <p:txBody>
+          <a:bodyPr anchorCtr="0" anchor="ctr" bIns="91425" lIns="91425" spcFirstLastPara="1" rIns="91425" wrap="square" tIns="91425">
+            <a:noAutofit/>
+          </a:bodyPr>
+          <a:lstStyle/>
+          <a:p>
+            <a:pPr indent="0" lvl="0" marL="0" rtl="0" algn="ctr">
+              <a:spcBef>
+                <a:spcPts val="0"/>
+              </a:spcBef>
+              <a:spcAft>
+                <a:spcPts val="0"/>
+              </a:spcAft>
+              <a:buNone/>
+            </a:pPr>
+            <a:r>
+              <a:t/>
+            </a:r>
+            <a:endParaRPr>
+              <a:solidFill>
+                <a:schemeClr val="lt1"/>
+              </a:solidFill>
+            </a:endParaRPr>
+          </a:p>
+        </p:txBody>
+      </p:sp>
+    </p:spTree>
+  </p:cSld>
+  <p:clrMapOvr>
+    <a:masterClrMapping/>
+  </p:clrMapOvr>
+</p:sld>
+</file>
+
+<file path=ppt/slides/slide21.xml><?xml version="1.0" encoding="utf-8"?>
+<p:sld xmlns:a="http://schemas.openxmlformats.org/drawingml/2006/main" xmlns:r="http://schemas.openxmlformats.org/officeDocument/2006/relationships" xmlns:mc="http://schemas.openxmlformats.org/markup-compatibility/2006" xmlns:mv="urn:schemas-microsoft-com:mac:vml" xmlns:p="http://schemas.openxmlformats.org/presentationml/2006/main" xmlns:c="http://schemas.openxmlformats.org/drawingml/2006/chart" xmlns:dgm="http://schemas.openxmlformats.org/drawingml/2006/diagram" xmlns:o="urn:schemas-microsoft-com:office:office" xmlns:v="urn:schemas-microsoft-com:vml" xmlns:pvml="urn:schemas-microsoft-com:office:powerpoint" xmlns:com="http://schemas.openxmlformats.org/drawingml/2006/compatibility" xmlns:p14="http://schemas.microsoft.com/office/powerpoint/2010/main" xmlns:p15="http://schemas.microsoft.com/office/powerpoint/2012/main" xmlns:ahyp="http://schemas.microsoft.com/office/drawing/2018/hyperlinkcolor">
+  <p:cSld>
+    <p:spTree>
+      <p:nvGrpSpPr>
+        <p:cNvPr id="230" name="Shape 230"/>
+        <p:cNvGrpSpPr/>
+        <p:nvPr/>
+      </p:nvGrpSpPr>
+      <p:grpSpPr>
+        <a:xfrm>
+          <a:off x="0" y="0"/>
+          <a:ext cx="0" cy="0"/>
+          <a:chOff x="0" y="0"/>
+          <a:chExt cx="0" cy="0"/>
+        </a:xfrm>
+      </p:grpSpPr>
+      <p:sp>
+        <p:nvSpPr>
+          <p:cNvPr id="231" name="Google Shape;231;p33"/>
+          <p:cNvSpPr txBox="1"/>
+          <p:nvPr>
+            <p:ph idx="12" type="sldNum"/>
+          </p:nvPr>
+        </p:nvSpPr>
+        <p:spPr>
+          <a:xfrm>
+            <a:off x="8472458" y="6217622"/>
+            <a:ext cx="548700" cy="524700"/>
+          </a:xfrm>
+          <a:prstGeom prst="rect">
+            <a:avLst/>
+          </a:prstGeom>
+        </p:spPr>
+        <p:txBody>
+          <a:bodyPr anchorCtr="0" anchor="ctr" bIns="91425" lIns="91425" spcFirstLastPara="1" rIns="91425" wrap="square" tIns="91425">
+            <a:normAutofit/>
+          </a:bodyPr>
+          <a:lstStyle/>
+          <a:p>
+            <a:pPr indent="0" lvl="0" marL="0" rtl="0" algn="r">
+              <a:spcBef>
+                <a:spcPts val="0"/>
+              </a:spcBef>
+              <a:spcAft>
+                <a:spcPts val="0"/>
+              </a:spcAft>
+              <a:buNone/>
+            </a:pPr>
+            <a:fld id="{00000000-1234-1234-1234-123412341234}" type="slidenum">
+              <a:rPr lang="en"/>
+              <a:t>‹#›</a:t>
+            </a:fld>
+            <a:endParaRPr/>
+          </a:p>
+        </p:txBody>
+      </p:sp>
+      <p:pic>
+        <p:nvPicPr>
+          <p:cNvPr id="232" name="Google Shape;232;p33"/>
+          <p:cNvPicPr preferRelativeResize="0"/>
+          <p:nvPr/>
+        </p:nvPicPr>
+        <p:blipFill>
+          <a:blip r:embed="rId3">
+            <a:alphaModFix/>
+          </a:blip>
+          <a:stretch>
+            <a:fillRect/>
+          </a:stretch>
+        </p:blipFill>
+        <p:spPr>
+          <a:xfrm>
+            <a:off x="1614375" y="155424"/>
+            <a:ext cx="5915260" cy="6062201"/>
+          </a:xfrm>
+          <a:prstGeom prst="rect">
+            <a:avLst/>
+          </a:prstGeom>
+          <a:noFill/>
+          <a:ln>
+            <a:noFill/>
+          </a:ln>
+        </p:spPr>
+      </p:pic>
+      <p:sp>
+        <p:nvSpPr>
+          <p:cNvPr id="233" name="Google Shape;233;p33"/>
           <p:cNvSpPr txBox="1"/>
           <p:nvPr/>
         </p:nvSpPr>
@@ -12134,7 +12558,7 @@
   <p:cSld>
     <p:spTree>
       <p:nvGrpSpPr>
-        <p:cNvPr id="225" name="Shape 225"/>
+        <p:cNvPr id="237" name="Shape 237"/>
         <p:cNvGrpSpPr/>
         <p:nvPr/>
       </p:nvGrpSpPr>
@@ -12148,7 +12572,7 @@
       </p:grpSpPr>
       <p:sp>
         <p:nvSpPr>
-          <p:cNvPr id="226" name="Google Shape;226;p34"/>
+          <p:cNvPr id="238" name="Google Shape;238;p34"/>
           <p:cNvSpPr txBox="1"/>
           <p:nvPr>
             <p:ph type="title"/>
@@ -12198,7 +12622,7 @@
       </p:sp>
       <p:sp>
         <p:nvSpPr>
-          <p:cNvPr id="227" name="Google Shape;227;p34"/>
+          <p:cNvPr id="239" name="Google Shape;239;p34"/>
           <p:cNvSpPr txBox="1"/>
           <p:nvPr>
             <p:ph idx="1" type="body"/>
@@ -12530,7 +12954,7 @@
       </p:sp>
       <p:sp>
         <p:nvSpPr>
-          <p:cNvPr id="228" name="Google Shape;228;p34"/>
+          <p:cNvPr id="240" name="Google Shape;240;p34"/>
           <p:cNvSpPr txBox="1"/>
           <p:nvPr>
             <p:ph idx="12" type="sldNum"/>
@@ -12581,7 +13005,7 @@
   <p:cSld>
     <p:spTree>
       <p:nvGrpSpPr>
-        <p:cNvPr id="232" name="Shape 232"/>
+        <p:cNvPr id="244" name="Shape 244"/>
         <p:cNvGrpSpPr/>
         <p:nvPr/>
       </p:nvGrpSpPr>
@@ -12595,7 +13019,7 @@
       </p:grpSpPr>
       <p:sp>
         <p:nvSpPr>
-          <p:cNvPr id="233" name="Google Shape;233;p35"/>
+          <p:cNvPr id="245" name="Google Shape;245;p35"/>
           <p:cNvSpPr txBox="1"/>
           <p:nvPr>
             <p:ph type="title"/>
@@ -12645,7 +13069,7 @@
       </p:sp>
       <p:sp>
         <p:nvSpPr>
-          <p:cNvPr id="234" name="Google Shape;234;p35"/>
+          <p:cNvPr id="246" name="Google Shape;246;p35"/>
           <p:cNvSpPr txBox="1"/>
           <p:nvPr>
             <p:ph idx="1" type="body"/>
@@ -12800,7 +13224,7 @@
       </p:sp>
       <p:sp>
         <p:nvSpPr>
-          <p:cNvPr id="235" name="Google Shape;235;p35"/>
+          <p:cNvPr id="247" name="Google Shape;247;p35"/>
           <p:cNvSpPr txBox="1"/>
           <p:nvPr>
             <p:ph idx="12" type="sldNum"/>
@@ -12840,7 +13264,7 @@
       </p:sp>
       <p:pic>
         <p:nvPicPr>
-          <p:cNvPr id="236" name="Google Shape;236;p35"/>
+          <p:cNvPr id="248" name="Google Shape;248;p35"/>
           <p:cNvPicPr preferRelativeResize="0"/>
           <p:nvPr/>
         </p:nvPicPr>
@@ -12879,7 +13303,7 @@
   <p:cSld>
     <p:spTree>
       <p:nvGrpSpPr>
-        <p:cNvPr id="240" name="Shape 240"/>
+        <p:cNvPr id="252" name="Shape 252"/>
         <p:cNvGrpSpPr/>
         <p:nvPr/>
       </p:nvGrpSpPr>
@@ -12893,7 +13317,7 @@
       </p:grpSpPr>
       <p:sp>
         <p:nvSpPr>
-          <p:cNvPr id="241" name="Google Shape;241;p36"/>
+          <p:cNvPr id="253" name="Google Shape;253;p36"/>
           <p:cNvSpPr txBox="1"/>
           <p:nvPr>
             <p:ph type="title"/>
@@ -12943,7 +13367,7 @@
       </p:sp>
       <p:sp>
         <p:nvSpPr>
-          <p:cNvPr id="242" name="Google Shape;242;p36"/>
+          <p:cNvPr id="254" name="Google Shape;254;p36"/>
           <p:cNvSpPr txBox="1"/>
           <p:nvPr>
             <p:ph idx="1" type="body"/>
@@ -13164,7 +13588,7 @@
       </p:sp>
       <p:sp>
         <p:nvSpPr>
-          <p:cNvPr id="243" name="Google Shape;243;p36"/>
+          <p:cNvPr id="255" name="Google Shape;255;p36"/>
           <p:cNvSpPr txBox="1"/>
           <p:nvPr>
             <p:ph idx="12" type="sldNum"/>
@@ -13204,7 +13628,7 @@
       </p:sp>
       <p:pic>
         <p:nvPicPr>
-          <p:cNvPr id="244" name="Google Shape;244;p36"/>
+          <p:cNvPr id="256" name="Google Shape;256;p36"/>
           <p:cNvPicPr preferRelativeResize="0"/>
           <p:nvPr/>
         </p:nvPicPr>
@@ -13232,7 +13656,7 @@
       </p:pic>
       <p:pic>
         <p:nvPicPr>
-          <p:cNvPr id="245" name="Google Shape;245;p36"/>
+          <p:cNvPr id="257" name="Google Shape;257;p36"/>
           <p:cNvPicPr preferRelativeResize="0"/>
           <p:nvPr/>
         </p:nvPicPr>
@@ -13271,7 +13695,7 @@
   <p:cSld>
     <p:spTree>
       <p:nvGrpSpPr>
-        <p:cNvPr id="249" name="Shape 249"/>
+        <p:cNvPr id="261" name="Shape 261"/>
         <p:cNvGrpSpPr/>
         <p:nvPr/>
       </p:nvGrpSpPr>
@@ -13285,7 +13709,7 @@
       </p:grpSpPr>
       <p:sp>
         <p:nvSpPr>
-          <p:cNvPr id="250" name="Google Shape;250;p37"/>
+          <p:cNvPr id="262" name="Google Shape;262;p37"/>
           <p:cNvSpPr txBox="1"/>
           <p:nvPr>
             <p:ph type="title"/>
@@ -13335,7 +13759,7 @@
       </p:sp>
       <p:sp>
         <p:nvSpPr>
-          <p:cNvPr id="251" name="Google Shape;251;p37"/>
+          <p:cNvPr id="263" name="Google Shape;263;p37"/>
           <p:cNvSpPr txBox="1"/>
           <p:nvPr>
             <p:ph idx="1" type="body"/>
@@ -13762,7 +14186,7 @@
       </p:sp>
       <p:sp>
         <p:nvSpPr>
-          <p:cNvPr id="252" name="Google Shape;252;p37"/>
+          <p:cNvPr id="264" name="Google Shape;264;p37"/>
           <p:cNvSpPr txBox="1"/>
           <p:nvPr>
             <p:ph idx="12" type="sldNum"/>
@@ -13939,13 +14363,12 @@
               <a:spcAft>
                 <a:spcPts val="0"/>
               </a:spcAft>
-              <a:buSzPts val="1018"/>
               <a:buNone/>
             </a:pPr>
             <a:r>
               <a:t/>
             </a:r>
-            <a:endParaRPr sz="2050">
+            <a:endParaRPr sz="100">
               <a:latin typeface="Roboto"/>
               <a:ea typeface="Roboto"/>
               <a:cs typeface="Roboto"/>
@@ -13984,12 +14407,35 @@
             </a:endParaRPr>
           </a:p>
           <a:p>
+            <a:pPr indent="0" lvl="0" marL="0" rtl="0" algn="l">
+              <a:lnSpc>
+                <a:spcPct val="95000"/>
+              </a:lnSpc>
+              <a:spcBef>
+                <a:spcPts val="1200"/>
+              </a:spcBef>
+              <a:spcAft>
+                <a:spcPts val="0"/>
+              </a:spcAft>
+              <a:buNone/>
+            </a:pPr>
+            <a:r>
+              <a:t/>
+            </a:r>
+            <a:endParaRPr sz="100">
+              <a:latin typeface="Roboto"/>
+              <a:ea typeface="Roboto"/>
+              <a:cs typeface="Roboto"/>
+              <a:sym typeface="Roboto"/>
+            </a:endParaRPr>
+          </a:p>
+          <a:p>
             <a:pPr indent="-358775" lvl="0" marL="457200" rtl="0" algn="l">
               <a:lnSpc>
                 <a:spcPct val="95000"/>
               </a:lnSpc>
               <a:spcBef>
-                <a:spcPts val="0"/>
+                <a:spcPts val="1200"/>
               </a:spcBef>
               <a:spcAft>
                 <a:spcPts val="0"/>
@@ -14158,13 +14604,12 @@
               <a:spcAft>
                 <a:spcPts val="0"/>
               </a:spcAft>
-              <a:buSzPts val="1018"/>
               <a:buNone/>
             </a:pPr>
             <a:r>
               <a:t/>
             </a:r>
-            <a:endParaRPr sz="2050">
+            <a:endParaRPr sz="100">
               <a:latin typeface="Roboto"/>
               <a:ea typeface="Roboto"/>
               <a:cs typeface="Roboto"/>
@@ -16663,7 +17108,7 @@
         </p:nvSpPr>
         <p:spPr>
           <a:xfrm>
-            <a:off x="311700" y="1536633"/>
+            <a:off x="311700" y="1509658"/>
             <a:ext cx="8520600" cy="4555200"/>
           </a:xfrm>
           <a:prstGeom prst="rect">
@@ -16921,6 +17366,218 @@
           </a:p>
         </p:txBody>
       </p:sp>
+      <p:sp>
+        <p:nvSpPr>
+          <p:cNvPr id="123" name="Google Shape;123;p21"/>
+          <p:cNvSpPr/>
+          <p:nvPr/>
+        </p:nvSpPr>
+        <p:spPr>
+          <a:xfrm>
+            <a:off x="854825" y="2088475"/>
+            <a:ext cx="641100" cy="3351300"/>
+          </a:xfrm>
+          <a:prstGeom prst="rect">
+            <a:avLst/>
+          </a:prstGeom>
+          <a:solidFill>
+            <a:schemeClr val="lt1"/>
+          </a:solidFill>
+          <a:ln cap="flat" cmpd="sng" w="9525">
+            <a:solidFill>
+              <a:schemeClr val="lt1"/>
+            </a:solidFill>
+            <a:prstDash val="solid"/>
+            <a:round/>
+            <a:headEnd len="sm" w="sm" type="none"/>
+            <a:tailEnd len="sm" w="sm" type="none"/>
+          </a:ln>
+        </p:spPr>
+        <p:txBody>
+          <a:bodyPr anchorCtr="0" anchor="ctr" bIns="91425" lIns="91425" spcFirstLastPara="1" rIns="91425" wrap="square" tIns="91425">
+            <a:noAutofit/>
+          </a:bodyPr>
+          <a:lstStyle/>
+          <a:p>
+            <a:pPr indent="0" lvl="0" marL="0" rtl="0" algn="ctr">
+              <a:spcBef>
+                <a:spcPts val="0"/>
+              </a:spcBef>
+              <a:spcAft>
+                <a:spcPts val="0"/>
+              </a:spcAft>
+              <a:buNone/>
+            </a:pPr>
+            <a:r>
+              <a:t/>
+            </a:r>
+            <a:endParaRPr>
+              <a:solidFill>
+                <a:schemeClr val="lt1"/>
+              </a:solidFill>
+            </a:endParaRPr>
+          </a:p>
+        </p:txBody>
+      </p:sp>
+      <p:sp>
+        <p:nvSpPr>
+          <p:cNvPr id="124" name="Google Shape;124;p21"/>
+          <p:cNvSpPr/>
+          <p:nvPr/>
+        </p:nvSpPr>
+        <p:spPr>
+          <a:xfrm rot="-5400000">
+            <a:off x="2847025" y="3913675"/>
+            <a:ext cx="552000" cy="3351300"/>
+          </a:xfrm>
+          <a:prstGeom prst="rect">
+            <a:avLst/>
+          </a:prstGeom>
+          <a:solidFill>
+            <a:schemeClr val="lt1"/>
+          </a:solidFill>
+          <a:ln cap="flat" cmpd="sng" w="9525">
+            <a:solidFill>
+              <a:schemeClr val="lt1"/>
+            </a:solidFill>
+            <a:prstDash val="solid"/>
+            <a:round/>
+            <a:headEnd len="sm" w="sm" type="none"/>
+            <a:tailEnd len="sm" w="sm" type="none"/>
+          </a:ln>
+        </p:spPr>
+        <p:txBody>
+          <a:bodyPr anchorCtr="0" anchor="ctr" bIns="91425" lIns="91425" spcFirstLastPara="1" rIns="91425" wrap="square" tIns="91425">
+            <a:noAutofit/>
+          </a:bodyPr>
+          <a:lstStyle/>
+          <a:p>
+            <a:pPr indent="0" lvl="0" marL="0" rtl="0" algn="ctr">
+              <a:spcBef>
+                <a:spcPts val="0"/>
+              </a:spcBef>
+              <a:spcAft>
+                <a:spcPts val="0"/>
+              </a:spcAft>
+              <a:buNone/>
+            </a:pPr>
+            <a:r>
+              <a:t/>
+            </a:r>
+            <a:endParaRPr>
+              <a:solidFill>
+                <a:schemeClr val="lt1"/>
+              </a:solidFill>
+            </a:endParaRPr>
+          </a:p>
+        </p:txBody>
+      </p:sp>
+      <p:sp>
+        <p:nvSpPr>
+          <p:cNvPr id="125" name="Google Shape;125;p21"/>
+          <p:cNvSpPr/>
+          <p:nvPr/>
+        </p:nvSpPr>
+        <p:spPr>
+          <a:xfrm>
+            <a:off x="4572000" y="2239875"/>
+            <a:ext cx="552000" cy="3351300"/>
+          </a:xfrm>
+          <a:prstGeom prst="rect">
+            <a:avLst/>
+          </a:prstGeom>
+          <a:solidFill>
+            <a:schemeClr val="lt1"/>
+          </a:solidFill>
+          <a:ln cap="flat" cmpd="sng" w="9525">
+            <a:solidFill>
+              <a:schemeClr val="lt1"/>
+            </a:solidFill>
+            <a:prstDash val="solid"/>
+            <a:round/>
+            <a:headEnd len="sm" w="sm" type="none"/>
+            <a:tailEnd len="sm" w="sm" type="none"/>
+          </a:ln>
+        </p:spPr>
+        <p:txBody>
+          <a:bodyPr anchorCtr="0" anchor="ctr" bIns="91425" lIns="91425" spcFirstLastPara="1" rIns="91425" wrap="square" tIns="91425">
+            <a:noAutofit/>
+          </a:bodyPr>
+          <a:lstStyle/>
+          <a:p>
+            <a:pPr indent="0" lvl="0" marL="0" rtl="0" algn="ctr">
+              <a:spcBef>
+                <a:spcPts val="0"/>
+              </a:spcBef>
+              <a:spcAft>
+                <a:spcPts val="0"/>
+              </a:spcAft>
+              <a:buNone/>
+            </a:pPr>
+            <a:r>
+              <a:t/>
+            </a:r>
+            <a:endParaRPr>
+              <a:solidFill>
+                <a:schemeClr val="lt1"/>
+              </a:solidFill>
+            </a:endParaRPr>
+          </a:p>
+        </p:txBody>
+      </p:sp>
+      <p:sp>
+        <p:nvSpPr>
+          <p:cNvPr id="126" name="Google Shape;126;p21"/>
+          <p:cNvSpPr/>
+          <p:nvPr/>
+        </p:nvSpPr>
+        <p:spPr>
+          <a:xfrm rot="-5400000">
+            <a:off x="6459200" y="3913675"/>
+            <a:ext cx="552000" cy="3351300"/>
+          </a:xfrm>
+          <a:prstGeom prst="rect">
+            <a:avLst/>
+          </a:prstGeom>
+          <a:solidFill>
+            <a:schemeClr val="lt1"/>
+          </a:solidFill>
+          <a:ln cap="flat" cmpd="sng" w="9525">
+            <a:solidFill>
+              <a:schemeClr val="lt1"/>
+            </a:solidFill>
+            <a:prstDash val="solid"/>
+            <a:round/>
+            <a:headEnd len="sm" w="sm" type="none"/>
+            <a:tailEnd len="sm" w="sm" type="none"/>
+          </a:ln>
+        </p:spPr>
+        <p:txBody>
+          <a:bodyPr anchorCtr="0" anchor="ctr" bIns="91425" lIns="91425" spcFirstLastPara="1" rIns="91425" wrap="square" tIns="91425">
+            <a:noAutofit/>
+          </a:bodyPr>
+          <a:lstStyle/>
+          <a:p>
+            <a:pPr indent="0" lvl="0" marL="0" rtl="0" algn="ctr">
+              <a:spcBef>
+                <a:spcPts val="0"/>
+              </a:spcBef>
+              <a:spcAft>
+                <a:spcPts val="0"/>
+              </a:spcAft>
+              <a:buNone/>
+            </a:pPr>
+            <a:r>
+              <a:t/>
+            </a:r>
+            <a:endParaRPr>
+              <a:solidFill>
+                <a:schemeClr val="lt1"/>
+              </a:solidFill>
+            </a:endParaRPr>
+          </a:p>
+        </p:txBody>
+      </p:sp>
     </p:spTree>
   </p:cSld>
   <p:clrMapOvr>
@@ -16930,6 +17587,285 @@
 </file>
 
 <file path=ppt/theme/theme1.xml><?xml version="1.0" encoding="utf-8"?>
+<a:theme xmlns:a="http://schemas.openxmlformats.org/drawingml/2006/main" xmlns:r="http://schemas.openxmlformats.org/officeDocument/2006/relationships" name="Simple Light">
+  <a:themeElements>
+    <a:clrScheme name="Simple Light">
+      <a:dk1>
+        <a:srgbClr val="000000"/>
+      </a:dk1>
+      <a:lt1>
+        <a:srgbClr val="FFFFFF"/>
+      </a:lt1>
+      <a:dk2>
+        <a:srgbClr val="595959"/>
+      </a:dk2>
+      <a:lt2>
+        <a:srgbClr val="EEEEEE"/>
+      </a:lt2>
+      <a:accent1>
+        <a:srgbClr val="4285F4"/>
+      </a:accent1>
+      <a:accent2>
+        <a:srgbClr val="212121"/>
+      </a:accent2>
+      <a:accent3>
+        <a:srgbClr val="78909C"/>
+      </a:accent3>
+      <a:accent4>
+        <a:srgbClr val="FFAB40"/>
+      </a:accent4>
+      <a:accent5>
+        <a:srgbClr val="0097A7"/>
+      </a:accent5>
+      <a:accent6>
+        <a:srgbClr val="EEFF41"/>
+      </a:accent6>
+      <a:hlink>
+        <a:srgbClr val="0097A7"/>
+      </a:hlink>
+      <a:folHlink>
+        <a:srgbClr val="0097A7"/>
+      </a:folHlink>
+    </a:clrScheme>
+    <a:fontScheme name="Office">
+      <a:majorFont>
+        <a:latin typeface="Arial"/>
+        <a:ea typeface=""/>
+        <a:cs typeface=""/>
+        <a:font script="Jpan" typeface="ＭＳ Ｐゴシック"/>
+        <a:font script="Hang" typeface="맑은 고딕"/>
+        <a:font script="Hans" typeface="宋体"/>
+        <a:font script="Hant" typeface="新細明體"/>
+        <a:font script="Arab" typeface="Times New Roman"/>
+        <a:font script="Hebr" typeface="Times New Roman"/>
+        <a:font script="Thai" typeface="Angsana New"/>
+        <a:font script="Ethi" typeface="Nyala"/>
+        <a:font script="Beng" typeface="Vrinda"/>
+        <a:font script="Gujr" typeface="Shruti"/>
+        <a:font script="Khmr" typeface="MoolBoran"/>
+        <a:font script="Knda" typeface="Tunga"/>
+        <a:font script="Guru" typeface="Raavi"/>
+        <a:font script="Cans" typeface="Euphemia"/>
+        <a:font script="Cher" typeface="Plantagenet Cherokee"/>
+        <a:font script="Yiii" typeface="Microsoft Yi Baiti"/>
+        <a:font script="Tibt" typeface="Microsoft Himalaya"/>
+        <a:font script="Thaa" typeface="MV Boli"/>
+        <a:font script="Deva" typeface="Mangal"/>
+        <a:font script="Telu" typeface="Gautami"/>
+        <a:font script="Taml" typeface="Latha"/>
+        <a:font script="Syrc" typeface="Estrangelo Edessa"/>
+        <a:font script="Orya" typeface="Kalinga"/>
+        <a:font script="Mlym" typeface="Kartika"/>
+        <a:font script="Laoo" typeface="DokChampa"/>
+        <a:font script="Sinh" typeface="Iskoola Pota"/>
+        <a:font script="Mong" typeface="Mongolian Baiti"/>
+        <a:font script="Viet" typeface="Times New Roman"/>
+        <a:font script="Uigh" typeface="Microsoft Uighur"/>
+        <a:font script="Geor" typeface="Sylfaen"/>
+      </a:majorFont>
+      <a:minorFont>
+        <a:latin typeface="Arial"/>
+        <a:ea typeface=""/>
+        <a:cs typeface=""/>
+        <a:font script="Jpan" typeface="ＭＳ Ｐゴシック"/>
+        <a:font script="Hang" typeface="맑은 고딕"/>
+        <a:font script="Hans" typeface="宋体"/>
+        <a:font script="Hant" typeface="新細明體"/>
+        <a:font script="Arab" typeface="Arial"/>
+        <a:font script="Hebr" typeface="Arial"/>
+        <a:font script="Thai" typeface="Cordia New"/>
+        <a:font script="Ethi" typeface="Nyala"/>
+        <a:font script="Beng" typeface="Vrinda"/>
+        <a:font script="Gujr" typeface="Shruti"/>
+        <a:font script="Khmr" typeface="DaunPenh"/>
+        <a:font script="Knda" typeface="Tunga"/>
+        <a:font script="Guru" typeface="Raavi"/>
+        <a:font script="Cans" typeface="Euphemia"/>
+        <a:font script="Cher" typeface="Plantagenet Cherokee"/>
+        <a:font script="Yiii" typeface="Microsoft Yi Baiti"/>
+        <a:font script="Tibt" typeface="Microsoft Himalaya"/>
+        <a:font script="Thaa" typeface="MV Boli"/>
+        <a:font script="Deva" typeface="Mangal"/>
+        <a:font script="Telu" typeface="Gautami"/>
+        <a:font script="Taml" typeface="Latha"/>
+        <a:font script="Syrc" typeface="Estrangelo Edessa"/>
+        <a:font script="Orya" typeface="Kalinga"/>
+        <a:font script="Mlym" typeface="Kartika"/>
+        <a:font script="Laoo" typeface="DokChampa"/>
+        <a:font script="Sinh" typeface="Iskoola Pota"/>
+        <a:font script="Mong" typeface="Mongolian Baiti"/>
+        <a:font script="Viet" typeface="Arial"/>
+        <a:font script="Uigh" typeface="Microsoft Uighur"/>
+        <a:font script="Geor" typeface="Sylfaen"/>
+      </a:minorFont>
+    </a:fontScheme>
+    <a:fmtScheme name="Office">
+      <a:fillStyleLst>
+        <a:solidFill>
+          <a:schemeClr val="phClr"/>
+        </a:solidFill>
+        <a:gradFill rotWithShape="1">
+          <a:gsLst>
+            <a:gs pos="0">
+              <a:schemeClr val="phClr">
+                <a:tint val="50000"/>
+                <a:satMod val="300000"/>
+              </a:schemeClr>
+            </a:gs>
+            <a:gs pos="35000">
+              <a:schemeClr val="phClr">
+                <a:tint val="37000"/>
+                <a:satMod val="300000"/>
+              </a:schemeClr>
+            </a:gs>
+            <a:gs pos="100000">
+              <a:schemeClr val="phClr">
+                <a:tint val="15000"/>
+                <a:satMod val="350000"/>
+              </a:schemeClr>
+            </a:gs>
+          </a:gsLst>
+          <a:lin ang="16200000" scaled="1"/>
+        </a:gradFill>
+        <a:gradFill rotWithShape="1">
+          <a:gsLst>
+            <a:gs pos="0">
+              <a:schemeClr val="phClr">
+                <a:tint val="100000"/>
+                <a:shade val="100000"/>
+                <a:satMod val="130000"/>
+              </a:schemeClr>
+            </a:gs>
+            <a:gs pos="100000">
+              <a:schemeClr val="phClr">
+                <a:tint val="50000"/>
+                <a:shade val="100000"/>
+                <a:satMod val="350000"/>
+              </a:schemeClr>
+            </a:gs>
+          </a:gsLst>
+          <a:lin ang="16200000" scaled="0"/>
+        </a:gradFill>
+      </a:fillStyleLst>
+      <a:lnStyleLst>
+        <a:ln w="9525" cap="flat" cmpd="sng" algn="ctr">
+          <a:solidFill>
+            <a:schemeClr val="phClr">
+              <a:shade val="95000"/>
+              <a:satMod val="105000"/>
+            </a:schemeClr>
+          </a:solidFill>
+          <a:prstDash val="solid"/>
+        </a:ln>
+        <a:ln w="25400" cap="flat" cmpd="sng" algn="ctr">
+          <a:solidFill>
+            <a:schemeClr val="phClr"/>
+          </a:solidFill>
+          <a:prstDash val="solid"/>
+        </a:ln>
+        <a:ln w="38100" cap="flat" cmpd="sng" algn="ctr">
+          <a:solidFill>
+            <a:schemeClr val="phClr"/>
+          </a:solidFill>
+          <a:prstDash val="solid"/>
+        </a:ln>
+      </a:lnStyleLst>
+      <a:effectStyleLst>
+        <a:effectStyle>
+          <a:effectLst>
+            <a:outerShdw blurRad="40000" dist="20000" dir="5400000" rotWithShape="0">
+              <a:srgbClr val="000000">
+                <a:alpha val="38000"/>
+              </a:srgbClr>
+            </a:outerShdw>
+          </a:effectLst>
+        </a:effectStyle>
+        <a:effectStyle>
+          <a:effectLst>
+            <a:outerShdw blurRad="40000" dist="23000" dir="5400000" rotWithShape="0">
+              <a:srgbClr val="000000">
+                <a:alpha val="35000"/>
+              </a:srgbClr>
+            </a:outerShdw>
+          </a:effectLst>
+        </a:effectStyle>
+        <a:effectStyle>
+          <a:effectLst>
+            <a:outerShdw blurRad="40000" dist="23000" dir="5400000" rotWithShape="0">
+              <a:srgbClr val="000000">
+                <a:alpha val="35000"/>
+              </a:srgbClr>
+            </a:outerShdw>
+          </a:effectLst>
+          <a:scene3d>
+            <a:camera prst="orthographicFront">
+              <a:rot lat="0" lon="0" rev="0"/>
+            </a:camera>
+            <a:lightRig rig="threePt" dir="t">
+              <a:rot lat="0" lon="0" rev="1200000"/>
+            </a:lightRig>
+          </a:scene3d>
+          <a:sp3d>
+            <a:bevelT w="63500" h="25400"/>
+          </a:sp3d>
+        </a:effectStyle>
+      </a:effectStyleLst>
+      <a:bgFillStyleLst>
+        <a:solidFill>
+          <a:schemeClr val="phClr"/>
+        </a:solidFill>
+        <a:gradFill rotWithShape="1">
+          <a:gsLst>
+            <a:gs pos="0">
+              <a:schemeClr val="phClr">
+                <a:tint val="40000"/>
+                <a:satMod val="350000"/>
+              </a:schemeClr>
+            </a:gs>
+            <a:gs pos="40000">
+              <a:schemeClr val="phClr">
+                <a:tint val="45000"/>
+                <a:shade val="99000"/>
+                <a:satMod val="350000"/>
+              </a:schemeClr>
+            </a:gs>
+            <a:gs pos="100000">
+              <a:schemeClr val="phClr">
+                <a:shade val="20000"/>
+                <a:satMod val="255000"/>
+              </a:schemeClr>
+            </a:gs>
+          </a:gsLst>
+          <a:path path="circle">
+            <a:fillToRect l="50000" t="-80000" r="50000" b="180000"/>
+          </a:path>
+        </a:gradFill>
+        <a:gradFill rotWithShape="1">
+          <a:gsLst>
+            <a:gs pos="0">
+              <a:schemeClr val="phClr">
+                <a:tint val="80000"/>
+                <a:satMod val="300000"/>
+              </a:schemeClr>
+            </a:gs>
+            <a:gs pos="100000">
+              <a:schemeClr val="phClr">
+                <a:shade val="30000"/>
+                <a:satMod val="200000"/>
+              </a:schemeClr>
+            </a:gs>
+          </a:gsLst>
+          <a:path path="circle">
+            <a:fillToRect l="50000" t="50000" r="50000" b="50000"/>
+          </a:path>
+        </a:gradFill>
+      </a:bgFillStyleLst>
+    </a:fmtScheme>
+  </a:themeElements>
+</a:theme>
+</file>
+
+<file path=ppt/theme/theme2.xml><?xml version="1.0" encoding="utf-8"?>
 <a:theme xmlns:a="http://schemas.openxmlformats.org/drawingml/2006/main" xmlns:r="http://schemas.openxmlformats.org/officeDocument/2006/relationships">
   <a:themeElements>
     <a:clrScheme name="Default">
@@ -17206,283 +18142,4 @@
     </a:fmtScheme>
   </a:themeElements>
 </a:theme>
-</file>
-
-<file path=ppt/theme/theme2.xml><?xml version="1.0" encoding="utf-8"?>
-<a:theme xmlns:a="http://schemas.openxmlformats.org/drawingml/2006/main" xmlns:r="http://schemas.openxmlformats.org/officeDocument/2006/relationships" name="Simple Light">
-  <a:themeElements>
-    <a:clrScheme name="Simple Light">
-      <a:dk1>
-        <a:srgbClr val="000000"/>
-      </a:dk1>
-      <a:lt1>
-        <a:srgbClr val="FFFFFF"/>
-      </a:lt1>
-      <a:dk2>
-        <a:srgbClr val="595959"/>
-      </a:dk2>
-      <a:lt2>
-        <a:srgbClr val="EEEEEE"/>
-      </a:lt2>
-      <a:accent1>
-        <a:srgbClr val="4285F4"/>
-      </a:accent1>
-      <a:accent2>
-        <a:srgbClr val="212121"/>
-      </a:accent2>
-      <a:accent3>
-        <a:srgbClr val="78909C"/>
-      </a:accent3>
-      <a:accent4>
-        <a:srgbClr val="FFAB40"/>
-      </a:accent4>
-      <a:accent5>
-        <a:srgbClr val="0097A7"/>
-      </a:accent5>
-      <a:accent6>
-        <a:srgbClr val="EEFF41"/>
-      </a:accent6>
-      <a:hlink>
-        <a:srgbClr val="0097A7"/>
-      </a:hlink>
-      <a:folHlink>
-        <a:srgbClr val="0097A7"/>
-      </a:folHlink>
-    </a:clrScheme>
-    <a:fontScheme name="Office">
-      <a:majorFont>
-        <a:latin typeface="Arial"/>
-        <a:ea typeface=""/>
-        <a:cs typeface=""/>
-        <a:font script="Jpan" typeface="ＭＳ Ｐゴシック"/>
-        <a:font script="Hang" typeface="맑은 고딕"/>
-        <a:font script="Hans" typeface="宋体"/>
-        <a:font script="Hant" typeface="新細明體"/>
-        <a:font script="Arab" typeface="Times New Roman"/>
-        <a:font script="Hebr" typeface="Times New Roman"/>
-        <a:font script="Thai" typeface="Angsana New"/>
-        <a:font script="Ethi" typeface="Nyala"/>
-        <a:font script="Beng" typeface="Vrinda"/>
-        <a:font script="Gujr" typeface="Shruti"/>
-        <a:font script="Khmr" typeface="MoolBoran"/>
-        <a:font script="Knda" typeface="Tunga"/>
-        <a:font script="Guru" typeface="Raavi"/>
-        <a:font script="Cans" typeface="Euphemia"/>
-        <a:font script="Cher" typeface="Plantagenet Cherokee"/>
-        <a:font script="Yiii" typeface="Microsoft Yi Baiti"/>
-        <a:font script="Tibt" typeface="Microsoft Himalaya"/>
-        <a:font script="Thaa" typeface="MV Boli"/>
-        <a:font script="Deva" typeface="Mangal"/>
-        <a:font script="Telu" typeface="Gautami"/>
-        <a:font script="Taml" typeface="Latha"/>
-        <a:font script="Syrc" typeface="Estrangelo Edessa"/>
-        <a:font script="Orya" typeface="Kalinga"/>
-        <a:font script="Mlym" typeface="Kartika"/>
-        <a:font script="Laoo" typeface="DokChampa"/>
-        <a:font script="Sinh" typeface="Iskoola Pota"/>
-        <a:font script="Mong" typeface="Mongolian Baiti"/>
-        <a:font script="Viet" typeface="Times New Roman"/>
-        <a:font script="Uigh" typeface="Microsoft Uighur"/>
-        <a:font script="Geor" typeface="Sylfaen"/>
-      </a:majorFont>
-      <a:minorFont>
-        <a:latin typeface="Arial"/>
-        <a:ea typeface=""/>
-        <a:cs typeface=""/>
-        <a:font script="Jpan" typeface="ＭＳ Ｐゴシック"/>
-        <a:font script="Hang" typeface="맑은 고딕"/>
-        <a:font script="Hans" typeface="宋体"/>
-        <a:font script="Hant" typeface="新細明體"/>
-        <a:font script="Arab" typeface="Arial"/>
-        <a:font script="Hebr" typeface="Arial"/>
-        <a:font script="Thai" typeface="Cordia New"/>
-        <a:font script="Ethi" typeface="Nyala"/>
-        <a:font script="Beng" typeface="Vrinda"/>
-        <a:font script="Gujr" typeface="Shruti"/>
-        <a:font script="Khmr" typeface="DaunPenh"/>
-        <a:font script="Knda" typeface="Tunga"/>
-        <a:font script="Guru" typeface="Raavi"/>
-        <a:font script="Cans" typeface="Euphemia"/>
-        <a:font script="Cher" typeface="Plantagenet Cherokee"/>
-        <a:font script="Yiii" typeface="Microsoft Yi Baiti"/>
-        <a:font script="Tibt" typeface="Microsoft Himalaya"/>
-        <a:font script="Thaa" typeface="MV Boli"/>
-        <a:font script="Deva" typeface="Mangal"/>
-        <a:font script="Telu" typeface="Gautami"/>
-        <a:font script="Taml" typeface="Latha"/>
-        <a:font script="Syrc" typeface="Estrangelo Edessa"/>
-        <a:font script="Orya" typeface="Kalinga"/>
-        <a:font script="Mlym" typeface="Kartika"/>
-        <a:font script="Laoo" typeface="DokChampa"/>
-        <a:font script="Sinh" typeface="Iskoola Pota"/>
-        <a:font script="Mong" typeface="Mongolian Baiti"/>
-        <a:font script="Viet" typeface="Arial"/>
-        <a:font script="Uigh" typeface="Microsoft Uighur"/>
-        <a:font script="Geor" typeface="Sylfaen"/>
-      </a:minorFont>
-    </a:fontScheme>
-    <a:fmtScheme name="Office">
-      <a:fillStyleLst>
-        <a:solidFill>
-          <a:schemeClr val="phClr"/>
-        </a:solidFill>
-        <a:gradFill rotWithShape="1">
-          <a:gsLst>
-            <a:gs pos="0">
-              <a:schemeClr val="phClr">
-                <a:tint val="50000"/>
-                <a:satMod val="300000"/>
-              </a:schemeClr>
-            </a:gs>
-            <a:gs pos="35000">
-              <a:schemeClr val="phClr">
-                <a:tint val="37000"/>
-                <a:satMod val="300000"/>
-              </a:schemeClr>
-            </a:gs>
-            <a:gs pos="100000">
-              <a:schemeClr val="phClr">
-                <a:tint val="15000"/>
-                <a:satMod val="350000"/>
-              </a:schemeClr>
-            </a:gs>
-          </a:gsLst>
-          <a:lin ang="16200000" scaled="1"/>
-        </a:gradFill>
-        <a:gradFill rotWithShape="1">
-          <a:gsLst>
-            <a:gs pos="0">
-              <a:schemeClr val="phClr">
-                <a:tint val="100000"/>
-                <a:shade val="100000"/>
-                <a:satMod val="130000"/>
-              </a:schemeClr>
-            </a:gs>
-            <a:gs pos="100000">
-              <a:schemeClr val="phClr">
-                <a:tint val="50000"/>
-                <a:shade val="100000"/>
-                <a:satMod val="350000"/>
-              </a:schemeClr>
-            </a:gs>
-          </a:gsLst>
-          <a:lin ang="16200000" scaled="0"/>
-        </a:gradFill>
-      </a:fillStyleLst>
-      <a:lnStyleLst>
-        <a:ln w="9525" cap="flat" cmpd="sng" algn="ctr">
-          <a:solidFill>
-            <a:schemeClr val="phClr">
-              <a:shade val="95000"/>
-              <a:satMod val="105000"/>
-            </a:schemeClr>
-          </a:solidFill>
-          <a:prstDash val="solid"/>
-        </a:ln>
-        <a:ln w="25400" cap="flat" cmpd="sng" algn="ctr">
-          <a:solidFill>
-            <a:schemeClr val="phClr"/>
-          </a:solidFill>
-          <a:prstDash val="solid"/>
-        </a:ln>
-        <a:ln w="38100" cap="flat" cmpd="sng" algn="ctr">
-          <a:solidFill>
-            <a:schemeClr val="phClr"/>
-          </a:solidFill>
-          <a:prstDash val="solid"/>
-        </a:ln>
-      </a:lnStyleLst>
-      <a:effectStyleLst>
-        <a:effectStyle>
-          <a:effectLst>
-            <a:outerShdw blurRad="40000" dist="20000" dir="5400000" rotWithShape="0">
-              <a:srgbClr val="000000">
-                <a:alpha val="38000"/>
-              </a:srgbClr>
-            </a:outerShdw>
-          </a:effectLst>
-        </a:effectStyle>
-        <a:effectStyle>
-          <a:effectLst>
-            <a:outerShdw blurRad="40000" dist="23000" dir="5400000" rotWithShape="0">
-              <a:srgbClr val="000000">
-                <a:alpha val="35000"/>
-              </a:srgbClr>
-            </a:outerShdw>
-          </a:effectLst>
-        </a:effectStyle>
-        <a:effectStyle>
-          <a:effectLst>
-            <a:outerShdw blurRad="40000" dist="23000" dir="5400000" rotWithShape="0">
-              <a:srgbClr val="000000">
-                <a:alpha val="35000"/>
-              </a:srgbClr>
-            </a:outerShdw>
-          </a:effectLst>
-          <a:scene3d>
-            <a:camera prst="orthographicFront">
-              <a:rot lat="0" lon="0" rev="0"/>
-            </a:camera>
-            <a:lightRig rig="threePt" dir="t">
-              <a:rot lat="0" lon="0" rev="1200000"/>
-            </a:lightRig>
-          </a:scene3d>
-          <a:sp3d>
-            <a:bevelT w="63500" h="25400"/>
-          </a:sp3d>
-        </a:effectStyle>
-      </a:effectStyleLst>
-      <a:bgFillStyleLst>
-        <a:solidFill>
-          <a:schemeClr val="phClr"/>
-        </a:solidFill>
-        <a:gradFill rotWithShape="1">
-          <a:gsLst>
-            <a:gs pos="0">
-              <a:schemeClr val="phClr">
-                <a:tint val="40000"/>
-                <a:satMod val="350000"/>
-              </a:schemeClr>
-            </a:gs>
-            <a:gs pos="40000">
-              <a:schemeClr val="phClr">
-                <a:tint val="45000"/>
-                <a:shade val="99000"/>
-                <a:satMod val="350000"/>
-              </a:schemeClr>
-            </a:gs>
-            <a:gs pos="100000">
-              <a:schemeClr val="phClr">
-                <a:shade val="20000"/>
-                <a:satMod val="255000"/>
-              </a:schemeClr>
-            </a:gs>
-          </a:gsLst>
-          <a:path path="circle">
-            <a:fillToRect l="50000" t="-80000" r="50000" b="180000"/>
-          </a:path>
-        </a:gradFill>
-        <a:gradFill rotWithShape="1">
-          <a:gsLst>
-            <a:gs pos="0">
-              <a:schemeClr val="phClr">
-                <a:tint val="80000"/>
-                <a:satMod val="300000"/>
-              </a:schemeClr>
-            </a:gs>
-            <a:gs pos="100000">
-              <a:schemeClr val="phClr">
-                <a:shade val="30000"/>
-                <a:satMod val="200000"/>
-              </a:schemeClr>
-            </a:gs>
-          </a:gsLst>
-          <a:path path="circle">
-            <a:fillToRect l="50000" t="50000" r="50000" b="50000"/>
-          </a:path>
-        </a:gradFill>
-      </a:bgFillStyleLst>
-    </a:fmtScheme>
-  </a:themeElements>
-</a:theme>
 </file>
</xml_diff>